<commit_message>
avancé sur le plan du site
</commit_message>
<xml_diff>
--- a/plan du site.pptx
+++ b/plan du site.pptx
@@ -11,6 +11,13 @@
     <p:sldId id="260" r:id="rId5"/>
     <p:sldId id="261" r:id="rId6"/>
     <p:sldId id="262" r:id="rId7"/>
+    <p:sldId id="263" r:id="rId8"/>
+    <p:sldId id="264" r:id="rId9"/>
+    <p:sldId id="265" r:id="rId10"/>
+    <p:sldId id="266" r:id="rId11"/>
+    <p:sldId id="267" r:id="rId12"/>
+    <p:sldId id="268" r:id="rId13"/>
+    <p:sldId id="269" r:id="rId14"/>
   </p:sldIdLst>
   <p:sldSz cx="12192000" cy="6858000"/>
   <p:notesSz cx="6858000" cy="9144000"/>
@@ -109,6 +116,11 @@
       </a:defRPr>
     </a:lvl9pPr>
   </p:defaultTextStyle>
+  <p:extLst>
+    <p:ext uri="{EFAFB233-063F-42B5-8137-9DF3F51BA10A}">
+      <p15:sldGuideLst xmlns:p15="http://schemas.microsoft.com/office/powerpoint/2012/main"/>
+    </p:ext>
+  </p:extLst>
 </p:presentation>
 </file>
 
@@ -3463,14 +3475,14 @@
         </p:nvSpPr>
         <p:spPr bwMode="auto">
           <a:xfrm>
-            <a:off x="520870" y="1432022"/>
-            <a:ext cx="1133475" cy="552450"/>
+            <a:off x="520870" y="1417954"/>
+            <a:ext cx="1068779" cy="662572"/>
           </a:xfrm>
           <a:prstGeom prst="rect">
             <a:avLst/>
           </a:prstGeom>
           <a:solidFill>
-            <a:srgbClr val="FFC000"/>
+            <a:srgbClr val="92D050"/>
           </a:solidFill>
           <a:ln w="12700">
             <a:solidFill>
@@ -3616,7 +3628,7 @@
             <a:avLst/>
           </a:prstGeom>
           <a:solidFill>
-            <a:srgbClr val="FFC000"/>
+            <a:srgbClr val="00B0F0"/>
           </a:solidFill>
           <a:ln w="12700">
             <a:solidFill>
@@ -3684,7 +3696,10 @@
             <a:avLst/>
           </a:prstGeom>
           <a:solidFill>
-            <a:srgbClr val="FFC000"/>
+            <a:schemeClr val="accent2">
+              <a:lumMod val="40000"/>
+              <a:lumOff val="60000"/>
+            </a:schemeClr>
           </a:solidFill>
           <a:ln w="12700">
             <a:solidFill>
@@ -3934,7 +3949,7 @@
           </a:solidFill>
           <a:ln w="12700">
             <a:solidFill>
-              <a:srgbClr val="70AD47"/>
+              <a:srgbClr val="FFC000"/>
             </a:solidFill>
             <a:miter lim="800000"/>
             <a:headEnd/>
@@ -3966,7 +3981,7 @@
               <a:tabLst/>
             </a:pPr>
             <a:r>
-              <a:rPr kumimoji="0" lang="fr-FR" altLang="fr-FR" sz="1100" b="0" i="0" u="none" strike="noStrike" cap="none" normalizeH="0" baseline="0">
+              <a:rPr kumimoji="0" lang="fr-FR" altLang="fr-FR" sz="1100" b="0" i="0" u="none" strike="noStrike" cap="none" normalizeH="0" baseline="0" dirty="0">
                 <a:ln>
                   <a:noFill/>
                 </a:ln>
@@ -3980,7 +3995,7 @@
               </a:rPr>
               <a:t>Points de ventes</a:t>
             </a:r>
-            <a:endParaRPr kumimoji="0" lang="fr-FR" altLang="fr-FR" sz="1800" b="0" i="0" u="none" strike="noStrike" cap="none" normalizeH="0" baseline="0">
+            <a:endParaRPr kumimoji="0" lang="fr-FR" altLang="fr-FR" sz="1800" b="0" i="0" u="none" strike="noStrike" cap="none" normalizeH="0" baseline="0" dirty="0">
               <a:ln>
                 <a:noFill/>
               </a:ln>
@@ -4010,6 +4025,416 @@
         <p:spPr bwMode="auto">
           <a:xfrm>
             <a:off x="3234764" y="4951826"/>
+            <a:ext cx="981075" cy="571500"/>
+          </a:xfrm>
+          <a:prstGeom prst="roundRect">
+            <a:avLst>
+              <a:gd name="adj" fmla="val 16667"/>
+            </a:avLst>
+          </a:prstGeom>
+          <a:solidFill>
+            <a:srgbClr val="FFFFFF"/>
+          </a:solidFill>
+          <a:ln w="12700">
+            <a:solidFill>
+              <a:srgbClr val="FFC000"/>
+            </a:solidFill>
+            <a:miter lim="800000"/>
+            <a:headEnd/>
+            <a:tailEnd/>
+          </a:ln>
+        </p:spPr>
+        <p:txBody>
+          <a:bodyPr vert="horz" wrap="square" lIns="91440" tIns="45720" rIns="91440" bIns="45720" numCol="1" anchor="ctr" anchorCtr="0" compatLnSpc="1">
+            <a:prstTxWarp prst="textNoShape">
+              <a:avLst/>
+            </a:prstTxWarp>
+          </a:bodyPr>
+          <a:lstStyle/>
+          <a:p>
+            <a:pPr marL="0" marR="0" lvl="0" indent="0" algn="ctr" defTabSz="914400" rtl="0" eaLnBrk="0" fontAlgn="base" latinLnBrk="0" hangingPunct="0">
+              <a:lnSpc>
+                <a:spcPct val="100000"/>
+              </a:lnSpc>
+              <a:spcBef>
+                <a:spcPct val="0"/>
+              </a:spcBef>
+              <a:spcAft>
+                <a:spcPct val="0"/>
+              </a:spcAft>
+              <a:buClrTx/>
+              <a:buSzTx/>
+              <a:buFontTx/>
+              <a:buNone/>
+              <a:tabLst/>
+            </a:pPr>
+            <a:r>
+              <a:rPr kumimoji="0" lang="fr-FR" altLang="fr-FR" sz="1100" b="0" i="0" u="none" strike="noStrike" cap="none" normalizeH="0" baseline="0" dirty="0">
+                <a:ln>
+                  <a:noFill/>
+                </a:ln>
+                <a:solidFill>
+                  <a:schemeClr val="tx1"/>
+                </a:solidFill>
+                <a:effectLst/>
+                <a:latin typeface="Calibri" panose="020F0502020204030204" pitchFamily="34" charset="0"/>
+                <a:ea typeface="Calibri" panose="020F0502020204030204" pitchFamily="34" charset="0"/>
+                <a:cs typeface="Times New Roman" panose="02020603050405020304" pitchFamily="18" charset="0"/>
+              </a:rPr>
+              <a:t>Louer un bus</a:t>
+            </a:r>
+            <a:endParaRPr kumimoji="0" lang="fr-FR" altLang="fr-FR" sz="1800" b="0" i="0" u="none" strike="noStrike" cap="none" normalizeH="0" baseline="0" dirty="0">
+              <a:ln>
+                <a:noFill/>
+              </a:ln>
+              <a:solidFill>
+                <a:schemeClr val="tx1"/>
+              </a:solidFill>
+              <a:effectLst/>
+              <a:latin typeface="Arial" panose="020B0604020202020204" pitchFamily="34" charset="0"/>
+            </a:endParaRPr>
+          </a:p>
+        </p:txBody>
+      </p:sp>
+      <p:sp>
+        <p:nvSpPr>
+          <p:cNvPr id="11" name="Rectangle : coins arrondis 10">
+            <a:extLst>
+              <a:ext uri="{FF2B5EF4-FFF2-40B4-BE49-F238E27FC236}">
+                <a16:creationId xmlns:a16="http://schemas.microsoft.com/office/drawing/2014/main" id="{2A9853D3-9FFC-4003-A8C4-4A9B224836AC}"/>
+              </a:ext>
+            </a:extLst>
+          </p:cNvPr>
+          <p:cNvSpPr>
+            <a:spLocks noChangeArrowheads="1"/>
+          </p:cNvSpPr>
+          <p:nvPr/>
+        </p:nvSpPr>
+        <p:spPr bwMode="auto">
+          <a:xfrm>
+            <a:off x="3234764" y="2562613"/>
+            <a:ext cx="981075" cy="571500"/>
+          </a:xfrm>
+          <a:prstGeom prst="roundRect">
+            <a:avLst>
+              <a:gd name="adj" fmla="val 16667"/>
+            </a:avLst>
+          </a:prstGeom>
+          <a:solidFill>
+            <a:srgbClr val="FFFFFF"/>
+          </a:solidFill>
+          <a:ln w="12700">
+            <a:solidFill>
+              <a:srgbClr val="FFC000"/>
+            </a:solidFill>
+            <a:miter lim="800000"/>
+            <a:headEnd/>
+            <a:tailEnd/>
+          </a:ln>
+        </p:spPr>
+        <p:txBody>
+          <a:bodyPr vert="horz" wrap="square" lIns="91440" tIns="45720" rIns="91440" bIns="45720" numCol="1" anchor="ctr" anchorCtr="0" compatLnSpc="1">
+            <a:prstTxWarp prst="textNoShape">
+              <a:avLst/>
+            </a:prstTxWarp>
+          </a:bodyPr>
+          <a:lstStyle/>
+          <a:p>
+            <a:pPr marL="0" marR="0" lvl="0" indent="0" algn="ctr" defTabSz="914400" rtl="0" eaLnBrk="0" fontAlgn="base" latinLnBrk="0" hangingPunct="0">
+              <a:lnSpc>
+                <a:spcPct val="100000"/>
+              </a:lnSpc>
+              <a:spcBef>
+                <a:spcPct val="0"/>
+              </a:spcBef>
+              <a:spcAft>
+                <a:spcPct val="0"/>
+              </a:spcAft>
+              <a:buClrTx/>
+              <a:buSzTx/>
+              <a:buFontTx/>
+              <a:buNone/>
+              <a:tabLst/>
+            </a:pPr>
+            <a:r>
+              <a:rPr kumimoji="0" lang="fr-FR" altLang="fr-FR" sz="1100" b="0" i="0" u="none" strike="noStrike" cap="none" normalizeH="0" baseline="0" dirty="0">
+                <a:ln>
+                  <a:noFill/>
+                </a:ln>
+                <a:solidFill>
+                  <a:schemeClr val="tx1"/>
+                </a:solidFill>
+                <a:effectLst/>
+                <a:latin typeface="Calibri" panose="020F0502020204030204" pitchFamily="34" charset="0"/>
+                <a:ea typeface="Calibri" panose="020F0502020204030204" pitchFamily="34" charset="0"/>
+                <a:cs typeface="Times New Roman" panose="02020603050405020304" pitchFamily="18" charset="0"/>
+              </a:rPr>
+              <a:t>Gérer ma réservation</a:t>
+            </a:r>
+            <a:endParaRPr kumimoji="0" lang="fr-FR" altLang="fr-FR" sz="1800" b="0" i="0" u="none" strike="noStrike" cap="none" normalizeH="0" baseline="0" dirty="0">
+              <a:ln>
+                <a:noFill/>
+              </a:ln>
+              <a:solidFill>
+                <a:schemeClr val="tx1"/>
+              </a:solidFill>
+              <a:effectLst/>
+              <a:latin typeface="Arial" panose="020B0604020202020204" pitchFamily="34" charset="0"/>
+            </a:endParaRPr>
+          </a:p>
+        </p:txBody>
+      </p:sp>
+      <p:sp>
+        <p:nvSpPr>
+          <p:cNvPr id="13" name="Rectangle 12">
+            <a:extLst>
+              <a:ext uri="{FF2B5EF4-FFF2-40B4-BE49-F238E27FC236}">
+                <a16:creationId xmlns:a16="http://schemas.microsoft.com/office/drawing/2014/main" id="{7FBF722A-79ED-4DA7-B3E7-4F7EAB2BF275}"/>
+              </a:ext>
+            </a:extLst>
+          </p:cNvPr>
+          <p:cNvSpPr>
+            <a:spLocks noChangeArrowheads="1"/>
+          </p:cNvSpPr>
+          <p:nvPr/>
+        </p:nvSpPr>
+        <p:spPr bwMode="auto">
+          <a:xfrm>
+            <a:off x="10509519" y="1432800"/>
+            <a:ext cx="1133475" cy="552450"/>
+          </a:xfrm>
+          <a:prstGeom prst="rect">
+            <a:avLst/>
+          </a:prstGeom>
+          <a:solidFill>
+            <a:schemeClr val="accent3"/>
+          </a:solidFill>
+          <a:ln w="12700">
+            <a:solidFill>
+              <a:srgbClr val="7F5F00"/>
+            </a:solidFill>
+            <a:miter lim="800000"/>
+            <a:headEnd/>
+            <a:tailEnd/>
+          </a:ln>
+        </p:spPr>
+        <p:txBody>
+          <a:bodyPr vert="horz" wrap="square" lIns="91440" tIns="45720" rIns="91440" bIns="45720" numCol="1" anchor="ctr" anchorCtr="0" compatLnSpc="1">
+            <a:prstTxWarp prst="textNoShape">
+              <a:avLst/>
+            </a:prstTxWarp>
+          </a:bodyPr>
+          <a:lstStyle/>
+          <a:p>
+            <a:pPr marL="0" marR="0" lvl="0" indent="0" algn="ctr" defTabSz="914400" rtl="0" eaLnBrk="0" fontAlgn="base" latinLnBrk="0" hangingPunct="0">
+              <a:lnSpc>
+                <a:spcPct val="100000"/>
+              </a:lnSpc>
+              <a:spcBef>
+                <a:spcPct val="0"/>
+              </a:spcBef>
+              <a:spcAft>
+                <a:spcPct val="0"/>
+              </a:spcAft>
+              <a:buClrTx/>
+              <a:buSzTx/>
+              <a:buFontTx/>
+              <a:buNone/>
+              <a:tabLst/>
+            </a:pPr>
+            <a:r>
+              <a:rPr lang="fr-FR" altLang="fr-FR" sz="1400" b="1" dirty="0">
+                <a:latin typeface="Calibri" panose="020F0502020204030204" pitchFamily="34" charset="0"/>
+                <a:cs typeface="Times New Roman" panose="02020603050405020304" pitchFamily="18" charset="0"/>
+              </a:rPr>
+              <a:t>LOG-IN</a:t>
+            </a:r>
+          </a:p>
+        </p:txBody>
+      </p:sp>
+      <p:sp>
+        <p:nvSpPr>
+          <p:cNvPr id="14" name="Rectangle : coins arrondis 13">
+            <a:extLst>
+              <a:ext uri="{FF2B5EF4-FFF2-40B4-BE49-F238E27FC236}">
+                <a16:creationId xmlns:a16="http://schemas.microsoft.com/office/drawing/2014/main" id="{BA8C7D5B-96AE-4BA4-B7A8-BBB0339E14F0}"/>
+              </a:ext>
+            </a:extLst>
+          </p:cNvPr>
+          <p:cNvSpPr>
+            <a:spLocks noChangeArrowheads="1"/>
+          </p:cNvSpPr>
+          <p:nvPr/>
+        </p:nvSpPr>
+        <p:spPr bwMode="auto">
+          <a:xfrm>
+            <a:off x="5872980" y="2562613"/>
+            <a:ext cx="981075" cy="571500"/>
+          </a:xfrm>
+          <a:prstGeom prst="roundRect">
+            <a:avLst>
+              <a:gd name="adj" fmla="val 16667"/>
+            </a:avLst>
+          </a:prstGeom>
+          <a:solidFill>
+            <a:srgbClr val="FFFFFF"/>
+          </a:solidFill>
+          <a:ln w="12700">
+            <a:solidFill>
+              <a:srgbClr val="00B0F0"/>
+            </a:solidFill>
+            <a:miter lim="800000"/>
+            <a:headEnd/>
+            <a:tailEnd/>
+          </a:ln>
+        </p:spPr>
+        <p:txBody>
+          <a:bodyPr vert="horz" wrap="square" lIns="91440" tIns="45720" rIns="91440" bIns="45720" numCol="1" anchor="ctr" anchorCtr="0" compatLnSpc="1">
+            <a:prstTxWarp prst="textNoShape">
+              <a:avLst/>
+            </a:prstTxWarp>
+          </a:bodyPr>
+          <a:lstStyle/>
+          <a:p>
+            <a:pPr marL="0" marR="0" lvl="0" indent="0" algn="ctr" defTabSz="914400" rtl="0" eaLnBrk="0" fontAlgn="base" latinLnBrk="0" hangingPunct="0">
+              <a:lnSpc>
+                <a:spcPct val="100000"/>
+              </a:lnSpc>
+              <a:spcBef>
+                <a:spcPct val="0"/>
+              </a:spcBef>
+              <a:spcAft>
+                <a:spcPct val="0"/>
+              </a:spcAft>
+              <a:buClrTx/>
+              <a:buSzTx/>
+              <a:buFontTx/>
+              <a:buNone/>
+              <a:tabLst/>
+            </a:pPr>
+            <a:r>
+              <a:rPr kumimoji="0" lang="fr-FR" altLang="fr-FR" sz="1100" b="0" i="0" u="none" strike="noStrike" cap="none" normalizeH="0" baseline="0" dirty="0">
+                <a:ln>
+                  <a:noFill/>
+                </a:ln>
+                <a:solidFill>
+                  <a:schemeClr val="tx1"/>
+                </a:solidFill>
+                <a:effectLst/>
+                <a:latin typeface="Calibri" panose="020F0502020204030204" pitchFamily="34" charset="0"/>
+                <a:ea typeface="Calibri" panose="020F0502020204030204" pitchFamily="34" charset="0"/>
+                <a:cs typeface="Times New Roman" panose="02020603050405020304" pitchFamily="18" charset="0"/>
+              </a:rPr>
+              <a:t>A propos</a:t>
+            </a:r>
+            <a:endParaRPr kumimoji="0" lang="fr-FR" altLang="fr-FR" sz="1800" b="0" i="0" u="none" strike="noStrike" cap="none" normalizeH="0" baseline="0" dirty="0">
+              <a:ln>
+                <a:noFill/>
+              </a:ln>
+              <a:solidFill>
+                <a:schemeClr val="tx1"/>
+              </a:solidFill>
+              <a:effectLst/>
+              <a:latin typeface="Arial" panose="020B0604020202020204" pitchFamily="34" charset="0"/>
+            </a:endParaRPr>
+          </a:p>
+        </p:txBody>
+      </p:sp>
+      <p:sp>
+        <p:nvSpPr>
+          <p:cNvPr id="15" name="Rectangle : coins arrondis 14">
+            <a:extLst>
+              <a:ext uri="{FF2B5EF4-FFF2-40B4-BE49-F238E27FC236}">
+                <a16:creationId xmlns:a16="http://schemas.microsoft.com/office/drawing/2014/main" id="{9C0EEBE9-88A9-4FD3-8939-C1D06164B129}"/>
+              </a:ext>
+            </a:extLst>
+          </p:cNvPr>
+          <p:cNvSpPr>
+            <a:spLocks noChangeArrowheads="1"/>
+          </p:cNvSpPr>
+          <p:nvPr/>
+        </p:nvSpPr>
+        <p:spPr bwMode="auto">
+          <a:xfrm>
+            <a:off x="5872980" y="3698671"/>
+            <a:ext cx="981075" cy="571500"/>
+          </a:xfrm>
+          <a:prstGeom prst="roundRect">
+            <a:avLst>
+              <a:gd name="adj" fmla="val 16667"/>
+            </a:avLst>
+          </a:prstGeom>
+          <a:solidFill>
+            <a:srgbClr val="FFFFFF"/>
+          </a:solidFill>
+          <a:ln w="12700">
+            <a:solidFill>
+              <a:srgbClr val="00B0F0"/>
+            </a:solidFill>
+            <a:miter lim="800000"/>
+            <a:headEnd/>
+            <a:tailEnd/>
+          </a:ln>
+        </p:spPr>
+        <p:txBody>
+          <a:bodyPr vert="horz" wrap="square" lIns="91440" tIns="45720" rIns="91440" bIns="45720" numCol="1" anchor="ctr" anchorCtr="0" compatLnSpc="1">
+            <a:prstTxWarp prst="textNoShape">
+              <a:avLst/>
+            </a:prstTxWarp>
+          </a:bodyPr>
+          <a:lstStyle/>
+          <a:p>
+            <a:pPr marL="0" marR="0" lvl="0" indent="0" algn="ctr" defTabSz="914400" rtl="0" eaLnBrk="0" fontAlgn="base" latinLnBrk="0" hangingPunct="0">
+              <a:lnSpc>
+                <a:spcPct val="100000"/>
+              </a:lnSpc>
+              <a:spcBef>
+                <a:spcPct val="0"/>
+              </a:spcBef>
+              <a:spcAft>
+                <a:spcPct val="0"/>
+              </a:spcAft>
+              <a:buClrTx/>
+              <a:buSzTx/>
+              <a:buFontTx/>
+              <a:buNone/>
+              <a:tabLst/>
+            </a:pPr>
+            <a:r>
+              <a:rPr kumimoji="0" lang="fr-FR" altLang="fr-FR" sz="1100" b="0" i="0" u="none" strike="noStrike" cap="none" normalizeH="0" baseline="0" dirty="0">
+                <a:ln>
+                  <a:noFill/>
+                </a:ln>
+                <a:solidFill>
+                  <a:schemeClr val="tx1"/>
+                </a:solidFill>
+                <a:effectLst/>
+                <a:latin typeface="Calibri" panose="020F0502020204030204" pitchFamily="34" charset="0"/>
+                <a:ea typeface="Calibri" panose="020F0502020204030204" pitchFamily="34" charset="0"/>
+                <a:cs typeface="Times New Roman" panose="02020603050405020304" pitchFamily="18" charset="0"/>
+              </a:rPr>
+              <a:t>Satisfaction client</a:t>
+            </a:r>
+          </a:p>
+        </p:txBody>
+      </p:sp>
+      <p:sp>
+        <p:nvSpPr>
+          <p:cNvPr id="17" name="Rectangle : coins arrondis 16">
+            <a:extLst>
+              <a:ext uri="{FF2B5EF4-FFF2-40B4-BE49-F238E27FC236}">
+                <a16:creationId xmlns:a16="http://schemas.microsoft.com/office/drawing/2014/main" id="{EAF9D0F8-B1F8-4770-9623-7078E52F798C}"/>
+              </a:ext>
+            </a:extLst>
+          </p:cNvPr>
+          <p:cNvSpPr>
+            <a:spLocks noChangeArrowheads="1"/>
+          </p:cNvSpPr>
+          <p:nvPr/>
+        </p:nvSpPr>
+        <p:spPr bwMode="auto">
+          <a:xfrm>
+            <a:off x="679098" y="4933414"/>
             <a:ext cx="981075" cy="571500"/>
           </a:xfrm>
           <a:prstGeom prst="roundRect">
@@ -4037,56 +4462,30 @@
           </a:bodyPr>
           <a:lstStyle/>
           <a:p>
-            <a:pPr marL="0" marR="0" lvl="0" indent="0" algn="ctr" defTabSz="914400" rtl="0" eaLnBrk="0" fontAlgn="base" latinLnBrk="0" hangingPunct="0">
-              <a:lnSpc>
-                <a:spcPct val="100000"/>
-              </a:lnSpc>
+            <a:pPr algn="ctr" eaLnBrk="0" fontAlgn="base" hangingPunct="0">
               <a:spcBef>
                 <a:spcPct val="0"/>
               </a:spcBef>
               <a:spcAft>
                 <a:spcPct val="0"/>
               </a:spcAft>
-              <a:buClrTx/>
-              <a:buSzTx/>
-              <a:buFontTx/>
-              <a:buNone/>
-              <a:tabLst/>
             </a:pPr>
             <a:r>
-              <a:rPr kumimoji="0" lang="fr-FR" altLang="fr-FR" sz="1100" b="0" i="0" u="none" strike="noStrike" cap="none" normalizeH="0" baseline="0" dirty="0">
-                <a:ln>
-                  <a:noFill/>
-                </a:ln>
-                <a:solidFill>
-                  <a:schemeClr val="tx1"/>
-                </a:solidFill>
-                <a:effectLst/>
+              <a:rPr lang="fr-FR" altLang="fr-FR" sz="1100" dirty="0">
                 <a:latin typeface="Calibri" panose="020F0502020204030204" pitchFamily="34" charset="0"/>
-                <a:ea typeface="Calibri" panose="020F0502020204030204" pitchFamily="34" charset="0"/>
                 <a:cs typeface="Times New Roman" panose="02020603050405020304" pitchFamily="18" charset="0"/>
               </a:rPr>
-              <a:t>Louer un bus</a:t>
-            </a:r>
-            <a:endParaRPr kumimoji="0" lang="fr-FR" altLang="fr-FR" sz="1800" b="0" i="0" u="none" strike="noStrike" cap="none" normalizeH="0" baseline="0" dirty="0">
-              <a:ln>
-                <a:noFill/>
-              </a:ln>
-              <a:solidFill>
-                <a:schemeClr val="tx1"/>
-              </a:solidFill>
-              <a:effectLst/>
-              <a:latin typeface="Arial" panose="020B0604020202020204" pitchFamily="34" charset="0"/>
-            </a:endParaRPr>
-          </a:p>
-        </p:txBody>
-      </p:sp>
-      <p:sp>
-        <p:nvSpPr>
-          <p:cNvPr id="11" name="Rectangle : coins arrondis 10">
-            <a:extLst>
-              <a:ext uri="{FF2B5EF4-FFF2-40B4-BE49-F238E27FC236}">
-                <a16:creationId xmlns:a16="http://schemas.microsoft.com/office/drawing/2014/main" id="{2A9853D3-9FFC-4003-A8C4-4A9B224836AC}"/>
+              <a:t>Compagnies et gares</a:t>
+            </a:r>
+          </a:p>
+        </p:txBody>
+      </p:sp>
+      <p:sp>
+        <p:nvSpPr>
+          <p:cNvPr id="18" name="Rectangle : coins arrondis 17">
+            <a:extLst>
+              <a:ext uri="{FF2B5EF4-FFF2-40B4-BE49-F238E27FC236}">
+                <a16:creationId xmlns:a16="http://schemas.microsoft.com/office/drawing/2014/main" id="{892E386E-2C36-4655-8D79-E518C4B64EBF}"/>
               </a:ext>
             </a:extLst>
           </p:cNvPr>
@@ -4097,7 +4496,7 @@
         </p:nvSpPr>
         <p:spPr bwMode="auto">
           <a:xfrm>
-            <a:off x="3234764" y="2562613"/>
+            <a:off x="5872980" y="4933414"/>
             <a:ext cx="981075" cy="571500"/>
           </a:xfrm>
           <a:prstGeom prst="roundRect">
@@ -4110,391 +4509,7 @@
           </a:solidFill>
           <a:ln w="12700">
             <a:solidFill>
-              <a:srgbClr val="70AD47"/>
-            </a:solidFill>
-            <a:miter lim="800000"/>
-            <a:headEnd/>
-            <a:tailEnd/>
-          </a:ln>
-        </p:spPr>
-        <p:txBody>
-          <a:bodyPr vert="horz" wrap="square" lIns="91440" tIns="45720" rIns="91440" bIns="45720" numCol="1" anchor="ctr" anchorCtr="0" compatLnSpc="1">
-            <a:prstTxWarp prst="textNoShape">
-              <a:avLst/>
-            </a:prstTxWarp>
-          </a:bodyPr>
-          <a:lstStyle/>
-          <a:p>
-            <a:pPr marL="0" marR="0" lvl="0" indent="0" algn="ctr" defTabSz="914400" rtl="0" eaLnBrk="0" fontAlgn="base" latinLnBrk="0" hangingPunct="0">
-              <a:lnSpc>
-                <a:spcPct val="100000"/>
-              </a:lnSpc>
-              <a:spcBef>
-                <a:spcPct val="0"/>
-              </a:spcBef>
-              <a:spcAft>
-                <a:spcPct val="0"/>
-              </a:spcAft>
-              <a:buClrTx/>
-              <a:buSzTx/>
-              <a:buFontTx/>
-              <a:buNone/>
-              <a:tabLst/>
-            </a:pPr>
-            <a:r>
-              <a:rPr kumimoji="0" lang="fr-FR" altLang="fr-FR" sz="1100" b="0" i="0" u="none" strike="noStrike" cap="none" normalizeH="0" baseline="0" dirty="0">
-                <a:ln>
-                  <a:noFill/>
-                </a:ln>
-                <a:solidFill>
-                  <a:schemeClr val="tx1"/>
-                </a:solidFill>
-                <a:effectLst/>
-                <a:latin typeface="Calibri" panose="020F0502020204030204" pitchFamily="34" charset="0"/>
-                <a:ea typeface="Calibri" panose="020F0502020204030204" pitchFamily="34" charset="0"/>
-                <a:cs typeface="Times New Roman" panose="02020603050405020304" pitchFamily="18" charset="0"/>
-              </a:rPr>
-              <a:t>Gérer ma réservation</a:t>
-            </a:r>
-            <a:endParaRPr kumimoji="0" lang="fr-FR" altLang="fr-FR" sz="1800" b="0" i="0" u="none" strike="noStrike" cap="none" normalizeH="0" baseline="0" dirty="0">
-              <a:ln>
-                <a:noFill/>
-              </a:ln>
-              <a:solidFill>
-                <a:schemeClr val="tx1"/>
-              </a:solidFill>
-              <a:effectLst/>
-              <a:latin typeface="Arial" panose="020B0604020202020204" pitchFamily="34" charset="0"/>
-            </a:endParaRPr>
-          </a:p>
-        </p:txBody>
-      </p:sp>
-      <p:sp>
-        <p:nvSpPr>
-          <p:cNvPr id="13" name="Rectangle 12">
-            <a:extLst>
-              <a:ext uri="{FF2B5EF4-FFF2-40B4-BE49-F238E27FC236}">
-                <a16:creationId xmlns:a16="http://schemas.microsoft.com/office/drawing/2014/main" id="{7FBF722A-79ED-4DA7-B3E7-4F7EAB2BF275}"/>
-              </a:ext>
-            </a:extLst>
-          </p:cNvPr>
-          <p:cNvSpPr>
-            <a:spLocks noChangeArrowheads="1"/>
-          </p:cNvSpPr>
-          <p:nvPr/>
-        </p:nvSpPr>
-        <p:spPr bwMode="auto">
-          <a:xfrm>
-            <a:off x="10509519" y="1432800"/>
-            <a:ext cx="1133475" cy="552450"/>
-          </a:xfrm>
-          <a:prstGeom prst="rect">
-            <a:avLst/>
-          </a:prstGeom>
-          <a:solidFill>
-            <a:srgbClr val="FFC000"/>
-          </a:solidFill>
-          <a:ln w="12700">
-            <a:solidFill>
-              <a:srgbClr val="7F5F00"/>
-            </a:solidFill>
-            <a:miter lim="800000"/>
-            <a:headEnd/>
-            <a:tailEnd/>
-          </a:ln>
-        </p:spPr>
-        <p:txBody>
-          <a:bodyPr vert="horz" wrap="square" lIns="91440" tIns="45720" rIns="91440" bIns="45720" numCol="1" anchor="ctr" anchorCtr="0" compatLnSpc="1">
-            <a:prstTxWarp prst="textNoShape">
-              <a:avLst/>
-            </a:prstTxWarp>
-          </a:bodyPr>
-          <a:lstStyle/>
-          <a:p>
-            <a:pPr marL="0" marR="0" lvl="0" indent="0" algn="ctr" defTabSz="914400" rtl="0" eaLnBrk="0" fontAlgn="base" latinLnBrk="0" hangingPunct="0">
-              <a:lnSpc>
-                <a:spcPct val="100000"/>
-              </a:lnSpc>
-              <a:spcBef>
-                <a:spcPct val="0"/>
-              </a:spcBef>
-              <a:spcAft>
-                <a:spcPct val="0"/>
-              </a:spcAft>
-              <a:buClrTx/>
-              <a:buSzTx/>
-              <a:buFontTx/>
-              <a:buNone/>
-              <a:tabLst/>
-            </a:pPr>
-            <a:r>
-              <a:rPr lang="fr-FR" altLang="fr-FR" sz="1400" b="1" dirty="0">
-                <a:latin typeface="Calibri" panose="020F0502020204030204" pitchFamily="34" charset="0"/>
-                <a:cs typeface="Times New Roman" panose="02020603050405020304" pitchFamily="18" charset="0"/>
-              </a:rPr>
-              <a:t>LOG-IN</a:t>
-            </a:r>
-          </a:p>
-        </p:txBody>
-      </p:sp>
-      <p:sp>
-        <p:nvSpPr>
-          <p:cNvPr id="14" name="Rectangle : coins arrondis 13">
-            <a:extLst>
-              <a:ext uri="{FF2B5EF4-FFF2-40B4-BE49-F238E27FC236}">
-                <a16:creationId xmlns:a16="http://schemas.microsoft.com/office/drawing/2014/main" id="{BA8C7D5B-96AE-4BA4-B7A8-BBB0339E14F0}"/>
-              </a:ext>
-            </a:extLst>
-          </p:cNvPr>
-          <p:cNvSpPr>
-            <a:spLocks noChangeArrowheads="1"/>
-          </p:cNvSpPr>
-          <p:nvPr/>
-        </p:nvSpPr>
-        <p:spPr bwMode="auto">
-          <a:xfrm>
-            <a:off x="5872980" y="2562613"/>
-            <a:ext cx="981075" cy="571500"/>
-          </a:xfrm>
-          <a:prstGeom prst="roundRect">
-            <a:avLst>
-              <a:gd name="adj" fmla="val 16667"/>
-            </a:avLst>
-          </a:prstGeom>
-          <a:solidFill>
-            <a:srgbClr val="FFFFFF"/>
-          </a:solidFill>
-          <a:ln w="12700">
-            <a:solidFill>
-              <a:srgbClr val="70AD47"/>
-            </a:solidFill>
-            <a:miter lim="800000"/>
-            <a:headEnd/>
-            <a:tailEnd/>
-          </a:ln>
-        </p:spPr>
-        <p:txBody>
-          <a:bodyPr vert="horz" wrap="square" lIns="91440" tIns="45720" rIns="91440" bIns="45720" numCol="1" anchor="ctr" anchorCtr="0" compatLnSpc="1">
-            <a:prstTxWarp prst="textNoShape">
-              <a:avLst/>
-            </a:prstTxWarp>
-          </a:bodyPr>
-          <a:lstStyle/>
-          <a:p>
-            <a:pPr marL="0" marR="0" lvl="0" indent="0" algn="ctr" defTabSz="914400" rtl="0" eaLnBrk="0" fontAlgn="base" latinLnBrk="0" hangingPunct="0">
-              <a:lnSpc>
-                <a:spcPct val="100000"/>
-              </a:lnSpc>
-              <a:spcBef>
-                <a:spcPct val="0"/>
-              </a:spcBef>
-              <a:spcAft>
-                <a:spcPct val="0"/>
-              </a:spcAft>
-              <a:buClrTx/>
-              <a:buSzTx/>
-              <a:buFontTx/>
-              <a:buNone/>
-              <a:tabLst/>
-            </a:pPr>
-            <a:r>
-              <a:rPr kumimoji="0" lang="fr-FR" altLang="fr-FR" sz="1100" b="0" i="0" u="none" strike="noStrike" cap="none" normalizeH="0" baseline="0" dirty="0">
-                <a:ln>
-                  <a:noFill/>
-                </a:ln>
-                <a:solidFill>
-                  <a:schemeClr val="tx1"/>
-                </a:solidFill>
-                <a:effectLst/>
-                <a:latin typeface="Calibri" panose="020F0502020204030204" pitchFamily="34" charset="0"/>
-                <a:ea typeface="Calibri" panose="020F0502020204030204" pitchFamily="34" charset="0"/>
-                <a:cs typeface="Times New Roman" panose="02020603050405020304" pitchFamily="18" charset="0"/>
-              </a:rPr>
-              <a:t>A propos</a:t>
-            </a:r>
-            <a:endParaRPr kumimoji="0" lang="fr-FR" altLang="fr-FR" sz="1800" b="0" i="0" u="none" strike="noStrike" cap="none" normalizeH="0" baseline="0" dirty="0">
-              <a:ln>
-                <a:noFill/>
-              </a:ln>
-              <a:solidFill>
-                <a:schemeClr val="tx1"/>
-              </a:solidFill>
-              <a:effectLst/>
-              <a:latin typeface="Arial" panose="020B0604020202020204" pitchFamily="34" charset="0"/>
-            </a:endParaRPr>
-          </a:p>
-        </p:txBody>
-      </p:sp>
-      <p:sp>
-        <p:nvSpPr>
-          <p:cNvPr id="15" name="Rectangle : coins arrondis 14">
-            <a:extLst>
-              <a:ext uri="{FF2B5EF4-FFF2-40B4-BE49-F238E27FC236}">
-                <a16:creationId xmlns:a16="http://schemas.microsoft.com/office/drawing/2014/main" id="{9C0EEBE9-88A9-4FD3-8939-C1D06164B129}"/>
-              </a:ext>
-            </a:extLst>
-          </p:cNvPr>
-          <p:cNvSpPr>
-            <a:spLocks noChangeArrowheads="1"/>
-          </p:cNvSpPr>
-          <p:nvPr/>
-        </p:nvSpPr>
-        <p:spPr bwMode="auto">
-          <a:xfrm>
-            <a:off x="5872980" y="3698671"/>
-            <a:ext cx="981075" cy="571500"/>
-          </a:xfrm>
-          <a:prstGeom prst="roundRect">
-            <a:avLst>
-              <a:gd name="adj" fmla="val 16667"/>
-            </a:avLst>
-          </a:prstGeom>
-          <a:solidFill>
-            <a:srgbClr val="FFFFFF"/>
-          </a:solidFill>
-          <a:ln w="12700">
-            <a:solidFill>
-              <a:srgbClr val="70AD47"/>
-            </a:solidFill>
-            <a:miter lim="800000"/>
-            <a:headEnd/>
-            <a:tailEnd/>
-          </a:ln>
-        </p:spPr>
-        <p:txBody>
-          <a:bodyPr vert="horz" wrap="square" lIns="91440" tIns="45720" rIns="91440" bIns="45720" numCol="1" anchor="ctr" anchorCtr="0" compatLnSpc="1">
-            <a:prstTxWarp prst="textNoShape">
-              <a:avLst/>
-            </a:prstTxWarp>
-          </a:bodyPr>
-          <a:lstStyle/>
-          <a:p>
-            <a:pPr marL="0" marR="0" lvl="0" indent="0" algn="ctr" defTabSz="914400" rtl="0" eaLnBrk="0" fontAlgn="base" latinLnBrk="0" hangingPunct="0">
-              <a:lnSpc>
-                <a:spcPct val="100000"/>
-              </a:lnSpc>
-              <a:spcBef>
-                <a:spcPct val="0"/>
-              </a:spcBef>
-              <a:spcAft>
-                <a:spcPct val="0"/>
-              </a:spcAft>
-              <a:buClrTx/>
-              <a:buSzTx/>
-              <a:buFontTx/>
-              <a:buNone/>
-              <a:tabLst/>
-            </a:pPr>
-            <a:r>
-              <a:rPr kumimoji="0" lang="fr-FR" altLang="fr-FR" sz="1100" b="0" i="0" u="none" strike="noStrike" cap="none" normalizeH="0" baseline="0" dirty="0">
-                <a:ln>
-                  <a:noFill/>
-                </a:ln>
-                <a:solidFill>
-                  <a:schemeClr val="tx1"/>
-                </a:solidFill>
-                <a:effectLst/>
-                <a:latin typeface="Calibri" panose="020F0502020204030204" pitchFamily="34" charset="0"/>
-                <a:ea typeface="Calibri" panose="020F0502020204030204" pitchFamily="34" charset="0"/>
-                <a:cs typeface="Times New Roman" panose="02020603050405020304" pitchFamily="18" charset="0"/>
-              </a:rPr>
-              <a:t>Satisfaction client</a:t>
-            </a:r>
-          </a:p>
-        </p:txBody>
-      </p:sp>
-      <p:sp>
-        <p:nvSpPr>
-          <p:cNvPr id="17" name="Rectangle : coins arrondis 16">
-            <a:extLst>
-              <a:ext uri="{FF2B5EF4-FFF2-40B4-BE49-F238E27FC236}">
-                <a16:creationId xmlns:a16="http://schemas.microsoft.com/office/drawing/2014/main" id="{EAF9D0F8-B1F8-4770-9623-7078E52F798C}"/>
-              </a:ext>
-            </a:extLst>
-          </p:cNvPr>
-          <p:cNvSpPr>
-            <a:spLocks noChangeArrowheads="1"/>
-          </p:cNvSpPr>
-          <p:nvPr/>
-        </p:nvSpPr>
-        <p:spPr bwMode="auto">
-          <a:xfrm>
-            <a:off x="679098" y="4933414"/>
-            <a:ext cx="981075" cy="571500"/>
-          </a:xfrm>
-          <a:prstGeom prst="roundRect">
-            <a:avLst>
-              <a:gd name="adj" fmla="val 16667"/>
-            </a:avLst>
-          </a:prstGeom>
-          <a:solidFill>
-            <a:srgbClr val="FFFFFF"/>
-          </a:solidFill>
-          <a:ln w="12700">
-            <a:solidFill>
-              <a:srgbClr val="70AD47"/>
-            </a:solidFill>
-            <a:miter lim="800000"/>
-            <a:headEnd/>
-            <a:tailEnd/>
-          </a:ln>
-        </p:spPr>
-        <p:txBody>
-          <a:bodyPr vert="horz" wrap="square" lIns="91440" tIns="45720" rIns="91440" bIns="45720" numCol="1" anchor="ctr" anchorCtr="0" compatLnSpc="1">
-            <a:prstTxWarp prst="textNoShape">
-              <a:avLst/>
-            </a:prstTxWarp>
-          </a:bodyPr>
-          <a:lstStyle/>
-          <a:p>
-            <a:pPr algn="ctr" eaLnBrk="0" fontAlgn="base" hangingPunct="0">
-              <a:spcBef>
-                <a:spcPct val="0"/>
-              </a:spcBef>
-              <a:spcAft>
-                <a:spcPct val="0"/>
-              </a:spcAft>
-            </a:pPr>
-            <a:r>
-              <a:rPr lang="fr-FR" altLang="fr-FR" sz="1100" dirty="0">
-                <a:latin typeface="Calibri" panose="020F0502020204030204" pitchFamily="34" charset="0"/>
-                <a:cs typeface="Times New Roman" panose="02020603050405020304" pitchFamily="18" charset="0"/>
-              </a:rPr>
-              <a:t>Compagnies et gares</a:t>
-            </a:r>
-          </a:p>
-        </p:txBody>
-      </p:sp>
-      <p:sp>
-        <p:nvSpPr>
-          <p:cNvPr id="18" name="Rectangle : coins arrondis 17">
-            <a:extLst>
-              <a:ext uri="{FF2B5EF4-FFF2-40B4-BE49-F238E27FC236}">
-                <a16:creationId xmlns:a16="http://schemas.microsoft.com/office/drawing/2014/main" id="{892E386E-2C36-4655-8D79-E518C4B64EBF}"/>
-              </a:ext>
-            </a:extLst>
-          </p:cNvPr>
-          <p:cNvSpPr>
-            <a:spLocks noChangeArrowheads="1"/>
-          </p:cNvSpPr>
-          <p:nvPr/>
-        </p:nvSpPr>
-        <p:spPr bwMode="auto">
-          <a:xfrm>
-            <a:off x="5872980" y="4933414"/>
-            <a:ext cx="981075" cy="571500"/>
-          </a:xfrm>
-          <a:prstGeom prst="roundRect">
-            <a:avLst>
-              <a:gd name="adj" fmla="val 16667"/>
-            </a:avLst>
-          </a:prstGeom>
-          <a:solidFill>
-            <a:srgbClr val="FFFFFF"/>
-          </a:solidFill>
-          <a:ln w="12700">
-            <a:solidFill>
-              <a:srgbClr val="70AD47"/>
+              <a:srgbClr val="00B0F0"/>
             </a:solidFill>
             <a:miter lim="800000"/>
             <a:headEnd/>
@@ -5027,44 +5042,6 @@
       </p:cxnSp>
       <p:cxnSp>
         <p:nvCxnSpPr>
-          <p:cNvPr id="40" name="Connecteur droit 39">
-            <a:extLst>
-              <a:ext uri="{FF2B5EF4-FFF2-40B4-BE49-F238E27FC236}">
-                <a16:creationId xmlns:a16="http://schemas.microsoft.com/office/drawing/2014/main" id="{6E8ECEA4-4FA2-4C03-BC71-85881CDD85EF}"/>
-              </a:ext>
-            </a:extLst>
-          </p:cNvPr>
-          <p:cNvCxnSpPr>
-            <a:stCxn id="3" idx="2"/>
-          </p:cNvCxnSpPr>
-          <p:nvPr/>
-        </p:nvCxnSpPr>
-        <p:spPr>
-          <a:xfrm flipH="1">
-            <a:off x="1087607" y="1984472"/>
-            <a:ext cx="1" cy="252291"/>
-          </a:xfrm>
-          <a:prstGeom prst="line">
-            <a:avLst/>
-          </a:prstGeom>
-        </p:spPr>
-        <p:style>
-          <a:lnRef idx="1">
-            <a:schemeClr val="accent1"/>
-          </a:lnRef>
-          <a:fillRef idx="0">
-            <a:schemeClr val="accent1"/>
-          </a:fillRef>
-          <a:effectRef idx="0">
-            <a:schemeClr val="accent1"/>
-          </a:effectRef>
-          <a:fontRef idx="minor">
-            <a:schemeClr val="tx1"/>
-          </a:fontRef>
-        </p:style>
-      </p:cxnSp>
-      <p:cxnSp>
-        <p:nvCxnSpPr>
           <p:cNvPr id="44" name="Connecteur droit 43">
             <a:extLst>
               <a:ext uri="{FF2B5EF4-FFF2-40B4-BE49-F238E27FC236}">
@@ -5571,6 +5548,45 @@
           <a:xfrm>
             <a:off x="6870918" y="5260773"/>
             <a:ext cx="594670" cy="0"/>
+          </a:xfrm>
+          <a:prstGeom prst="line">
+            <a:avLst/>
+          </a:prstGeom>
+        </p:spPr>
+        <p:style>
+          <a:lnRef idx="1">
+            <a:schemeClr val="accent1"/>
+          </a:lnRef>
+          <a:fillRef idx="0">
+            <a:schemeClr val="accent1"/>
+          </a:fillRef>
+          <a:effectRef idx="0">
+            <a:schemeClr val="accent1"/>
+          </a:effectRef>
+          <a:fontRef idx="minor">
+            <a:schemeClr val="tx1"/>
+          </a:fontRef>
+        </p:style>
+      </p:cxnSp>
+      <p:cxnSp>
+        <p:nvCxnSpPr>
+          <p:cNvPr id="46" name="Connecteur droit 45">
+            <a:extLst>
+              <a:ext uri="{FF2B5EF4-FFF2-40B4-BE49-F238E27FC236}">
+                <a16:creationId xmlns:a16="http://schemas.microsoft.com/office/drawing/2014/main" id="{12D08BDE-1217-4B85-80AF-9396EECA0FA6}"/>
+              </a:ext>
+            </a:extLst>
+          </p:cNvPr>
+          <p:cNvCxnSpPr>
+            <a:cxnSpLocks/>
+            <a:stCxn id="3" idx="2"/>
+          </p:cNvCxnSpPr>
+          <p:nvPr/>
+        </p:nvCxnSpPr>
+        <p:spPr>
+          <a:xfrm>
+            <a:off x="1055260" y="2080526"/>
+            <a:ext cx="30312" cy="153023"/>
           </a:xfrm>
           <a:prstGeom prst="line">
             <a:avLst/>
@@ -5604,9 +5620,17 @@
 </p:sld>
 </file>
 
-<file path=ppt/slides/slide2.xml><?xml version="1.0" encoding="utf-8"?>
+<file path=ppt/slides/slide10.xml><?xml version="1.0" encoding="utf-8"?>
 <p:sld xmlns:a="http://schemas.openxmlformats.org/drawingml/2006/main" xmlns:r="http://schemas.openxmlformats.org/officeDocument/2006/relationships" xmlns:p="http://schemas.openxmlformats.org/presentationml/2006/main">
   <p:cSld>
+    <p:bg>
+      <p:bgPr>
+        <a:solidFill>
+          <a:srgbClr val="00B0F0"/>
+        </a:solidFill>
+        <a:effectLst/>
+      </p:bgPr>
+    </p:bg>
     <p:spTree>
       <p:nvGrpSpPr>
         <p:cNvPr id="1" name=""/>
@@ -5637,6 +5661,691 @@
             <p:ph type="title"/>
           </p:nvPr>
         </p:nvSpPr>
+        <p:spPr>
+          <a:xfrm>
+            <a:off x="838200" y="365125"/>
+            <a:ext cx="11189677" cy="1325563"/>
+          </a:xfrm>
+        </p:spPr>
+        <p:txBody>
+          <a:bodyPr/>
+          <a:lstStyle/>
+          <a:p>
+            <a:r>
+              <a:rPr lang="fr-FR" altLang="fr-FR" b="1" dirty="0">
+                <a:latin typeface="Calibri" panose="020F0502020204030204" pitchFamily="34" charset="0"/>
+                <a:cs typeface="Times New Roman" panose="02020603050405020304" pitchFamily="18" charset="0"/>
+              </a:rPr>
+              <a:t>L’entreprise </a:t>
+            </a:r>
+            <a:r>
+              <a:rPr lang="fr-FR" altLang="fr-FR" b="1" dirty="0">
+                <a:latin typeface="Calibri" panose="020F0502020204030204" pitchFamily="34" charset="0"/>
+                <a:ea typeface="Calibri" panose="020F0502020204030204" pitchFamily="34" charset="0"/>
+                <a:cs typeface="Times New Roman" panose="02020603050405020304" pitchFamily="18" charset="0"/>
+              </a:rPr>
+              <a:t>: </a:t>
+            </a:r>
+            <a:r>
+              <a:rPr lang="fr-FR" altLang="fr-FR" dirty="0">
+                <a:latin typeface="Calibri" panose="020F0502020204030204" pitchFamily="34" charset="0"/>
+                <a:ea typeface="Calibri" panose="020F0502020204030204" pitchFamily="34" charset="0"/>
+                <a:cs typeface="Times New Roman" panose="02020603050405020304" pitchFamily="18" charset="0"/>
+              </a:rPr>
+              <a:t>Louer un bus</a:t>
+            </a:r>
+            <a:endParaRPr lang="fr-FR" dirty="0"/>
+          </a:p>
+        </p:txBody>
+      </p:sp>
+      <p:sp>
+        <p:nvSpPr>
+          <p:cNvPr id="3" name="ZoneTexte 2">
+            <a:extLst>
+              <a:ext uri="{FF2B5EF4-FFF2-40B4-BE49-F238E27FC236}">
+                <a16:creationId xmlns:a16="http://schemas.microsoft.com/office/drawing/2014/main" id="{027CB3A8-775D-4714-BF00-99753B6C6F79}"/>
+              </a:ext>
+            </a:extLst>
+          </p:cNvPr>
+          <p:cNvSpPr txBox="1"/>
+          <p:nvPr/>
+        </p:nvSpPr>
+        <p:spPr>
+          <a:xfrm>
+            <a:off x="1026941" y="1690688"/>
+            <a:ext cx="10522633" cy="1477328"/>
+          </a:xfrm>
+          <a:prstGeom prst="rect">
+            <a:avLst/>
+          </a:prstGeom>
+          <a:noFill/>
+        </p:spPr>
+        <p:txBody>
+          <a:bodyPr wrap="square" rtlCol="0">
+            <a:spAutoFit/>
+          </a:bodyPr>
+          <a:lstStyle/>
+          <a:p>
+            <a:pPr marL="285750" indent="-285750">
+              <a:buFont typeface="Arial" panose="020B0604020202020204" pitchFamily="34" charset="0"/>
+              <a:buChar char="•"/>
+            </a:pPr>
+            <a:r>
+              <a:rPr lang="fr-FR" dirty="0"/>
+              <a:t>Section entrée des données pour la réservation</a:t>
+            </a:r>
+          </a:p>
+          <a:p>
+            <a:pPr marL="285750" indent="-285750">
+              <a:buFont typeface="Arial" panose="020B0604020202020204" pitchFamily="34" charset="0"/>
+              <a:buChar char="•"/>
+            </a:pPr>
+            <a:r>
+              <a:rPr lang="fr-FR" dirty="0"/>
+              <a:t>Section avantage du service de réservation son propre bus </a:t>
+            </a:r>
+          </a:p>
+          <a:p>
+            <a:pPr marL="285750" indent="-285750">
+              <a:buFont typeface="Arial" panose="020B0604020202020204" pitchFamily="34" charset="0"/>
+              <a:buChar char="•"/>
+            </a:pPr>
+            <a:r>
+              <a:rPr lang="fr-FR" dirty="0"/>
+              <a:t>Section témoignage des anciens clients</a:t>
+            </a:r>
+          </a:p>
+          <a:p>
+            <a:pPr marL="285750" indent="-285750">
+              <a:buFont typeface="Arial" panose="020B0604020202020204" pitchFamily="34" charset="0"/>
+              <a:buChar char="•"/>
+            </a:pPr>
+            <a:r>
+              <a:rPr lang="fr-FR" dirty="0"/>
+              <a:t>Section comment ça marche </a:t>
+            </a:r>
+          </a:p>
+          <a:p>
+            <a:pPr marL="285750" indent="-285750">
+              <a:buFont typeface="Arial" panose="020B0604020202020204" pitchFamily="34" charset="0"/>
+              <a:buChar char="•"/>
+            </a:pPr>
+            <a:r>
+              <a:rPr lang="fr-FR" dirty="0"/>
+              <a:t>Le pied de page</a:t>
+            </a:r>
+          </a:p>
+        </p:txBody>
+      </p:sp>
+    </p:spTree>
+    <p:extLst>
+      <p:ext uri="{BB962C8B-B14F-4D97-AF65-F5344CB8AC3E}">
+        <p14:creationId xmlns:p14="http://schemas.microsoft.com/office/powerpoint/2010/main" val="3288368779"/>
+      </p:ext>
+    </p:extLst>
+  </p:cSld>
+  <p:clrMapOvr>
+    <a:masterClrMapping/>
+  </p:clrMapOvr>
+</p:sld>
+</file>
+
+<file path=ppt/slides/slide11.xml><?xml version="1.0" encoding="utf-8"?>
+<p:sld xmlns:a="http://schemas.openxmlformats.org/drawingml/2006/main" xmlns:r="http://schemas.openxmlformats.org/officeDocument/2006/relationships" xmlns:p="http://schemas.openxmlformats.org/presentationml/2006/main">
+  <p:cSld>
+    <p:bg>
+      <p:bgPr>
+        <a:solidFill>
+          <a:srgbClr val="00B0F0"/>
+        </a:solidFill>
+        <a:effectLst/>
+      </p:bgPr>
+    </p:bg>
+    <p:spTree>
+      <p:nvGrpSpPr>
+        <p:cNvPr id="1" name=""/>
+        <p:cNvGrpSpPr/>
+        <p:nvPr/>
+      </p:nvGrpSpPr>
+      <p:grpSpPr>
+        <a:xfrm>
+          <a:off x="0" y="0"/>
+          <a:ext cx="0" cy="0"/>
+          <a:chOff x="0" y="0"/>
+          <a:chExt cx="0" cy="0"/>
+        </a:xfrm>
+      </p:grpSpPr>
+      <p:sp>
+        <p:nvSpPr>
+          <p:cNvPr id="2" name="Titre 1">
+            <a:extLst>
+              <a:ext uri="{FF2B5EF4-FFF2-40B4-BE49-F238E27FC236}">
+                <a16:creationId xmlns:a16="http://schemas.microsoft.com/office/drawing/2014/main" id="{173A5FD7-5E5B-4F12-BA5C-1AB6C6DA9F1E}"/>
+              </a:ext>
+            </a:extLst>
+          </p:cNvPr>
+          <p:cNvSpPr>
+            <a:spLocks noGrp="1"/>
+          </p:cNvSpPr>
+          <p:nvPr>
+            <p:ph type="title"/>
+          </p:nvPr>
+        </p:nvSpPr>
+        <p:spPr>
+          <a:xfrm>
+            <a:off x="838200" y="365125"/>
+            <a:ext cx="11189677" cy="1325563"/>
+          </a:xfrm>
+        </p:spPr>
+        <p:txBody>
+          <a:bodyPr/>
+          <a:lstStyle/>
+          <a:p>
+            <a:r>
+              <a:rPr lang="fr-FR" altLang="fr-FR" b="1" dirty="0">
+                <a:latin typeface="Calibri" panose="020F0502020204030204" pitchFamily="34" charset="0"/>
+                <a:cs typeface="Times New Roman" panose="02020603050405020304" pitchFamily="18" charset="0"/>
+              </a:rPr>
+              <a:t>L’entreprise </a:t>
+            </a:r>
+            <a:r>
+              <a:rPr lang="fr-FR" altLang="fr-FR" b="1" dirty="0">
+                <a:latin typeface="Calibri" panose="020F0502020204030204" pitchFamily="34" charset="0"/>
+                <a:ea typeface="Calibri" panose="020F0502020204030204" pitchFamily="34" charset="0"/>
+                <a:cs typeface="Times New Roman" panose="02020603050405020304" pitchFamily="18" charset="0"/>
+              </a:rPr>
+              <a:t>: </a:t>
+            </a:r>
+            <a:r>
+              <a:rPr lang="fr-FR" altLang="fr-FR" dirty="0">
+                <a:latin typeface="Calibri" panose="020F0502020204030204" pitchFamily="34" charset="0"/>
+                <a:ea typeface="Calibri" panose="020F0502020204030204" pitchFamily="34" charset="0"/>
+                <a:cs typeface="Times New Roman" panose="02020603050405020304" pitchFamily="18" charset="0"/>
+              </a:rPr>
+              <a:t>Louer un bus</a:t>
+            </a:r>
+            <a:endParaRPr lang="fr-FR" dirty="0"/>
+          </a:p>
+        </p:txBody>
+      </p:sp>
+      <p:sp>
+        <p:nvSpPr>
+          <p:cNvPr id="3" name="ZoneTexte 2">
+            <a:extLst>
+              <a:ext uri="{FF2B5EF4-FFF2-40B4-BE49-F238E27FC236}">
+                <a16:creationId xmlns:a16="http://schemas.microsoft.com/office/drawing/2014/main" id="{027CB3A8-775D-4714-BF00-99753B6C6F79}"/>
+              </a:ext>
+            </a:extLst>
+          </p:cNvPr>
+          <p:cNvSpPr txBox="1"/>
+          <p:nvPr/>
+        </p:nvSpPr>
+        <p:spPr>
+          <a:xfrm>
+            <a:off x="1026941" y="1690688"/>
+            <a:ext cx="10522633" cy="1477328"/>
+          </a:xfrm>
+          <a:prstGeom prst="rect">
+            <a:avLst/>
+          </a:prstGeom>
+          <a:noFill/>
+        </p:spPr>
+        <p:txBody>
+          <a:bodyPr wrap="square" rtlCol="0">
+            <a:spAutoFit/>
+          </a:bodyPr>
+          <a:lstStyle/>
+          <a:p>
+            <a:pPr marL="285750" indent="-285750">
+              <a:buFont typeface="Arial" panose="020B0604020202020204" pitchFamily="34" charset="0"/>
+              <a:buChar char="•"/>
+            </a:pPr>
+            <a:r>
+              <a:rPr lang="fr-FR" dirty="0"/>
+              <a:t>Section entrée des données pour la réservation</a:t>
+            </a:r>
+          </a:p>
+          <a:p>
+            <a:pPr marL="285750" indent="-285750">
+              <a:buFont typeface="Arial" panose="020B0604020202020204" pitchFamily="34" charset="0"/>
+              <a:buChar char="•"/>
+            </a:pPr>
+            <a:r>
+              <a:rPr lang="fr-FR" dirty="0"/>
+              <a:t>Section avantage du service de réservation son propre bus </a:t>
+            </a:r>
+          </a:p>
+          <a:p>
+            <a:pPr marL="285750" indent="-285750">
+              <a:buFont typeface="Arial" panose="020B0604020202020204" pitchFamily="34" charset="0"/>
+              <a:buChar char="•"/>
+            </a:pPr>
+            <a:r>
+              <a:rPr lang="fr-FR" dirty="0"/>
+              <a:t>Section témoignage des anciens clients</a:t>
+            </a:r>
+          </a:p>
+          <a:p>
+            <a:pPr marL="285750" indent="-285750">
+              <a:buFont typeface="Arial" panose="020B0604020202020204" pitchFamily="34" charset="0"/>
+              <a:buChar char="•"/>
+            </a:pPr>
+            <a:r>
+              <a:rPr lang="fr-FR" dirty="0"/>
+              <a:t>Section comment ça marche </a:t>
+            </a:r>
+          </a:p>
+          <a:p>
+            <a:pPr marL="285750" indent="-285750">
+              <a:buFont typeface="Arial" panose="020B0604020202020204" pitchFamily="34" charset="0"/>
+              <a:buChar char="•"/>
+            </a:pPr>
+            <a:r>
+              <a:rPr lang="fr-FR" dirty="0"/>
+              <a:t>Le pied de page</a:t>
+            </a:r>
+          </a:p>
+        </p:txBody>
+      </p:sp>
+    </p:spTree>
+    <p:extLst>
+      <p:ext uri="{BB962C8B-B14F-4D97-AF65-F5344CB8AC3E}">
+        <p14:creationId xmlns:p14="http://schemas.microsoft.com/office/powerpoint/2010/main" val="3772829318"/>
+      </p:ext>
+    </p:extLst>
+  </p:cSld>
+  <p:clrMapOvr>
+    <a:masterClrMapping/>
+  </p:clrMapOvr>
+</p:sld>
+</file>
+
+<file path=ppt/slides/slide12.xml><?xml version="1.0" encoding="utf-8"?>
+<p:sld xmlns:a="http://schemas.openxmlformats.org/drawingml/2006/main" xmlns:r="http://schemas.openxmlformats.org/officeDocument/2006/relationships" xmlns:p="http://schemas.openxmlformats.org/presentationml/2006/main">
+  <p:cSld>
+    <p:bg>
+      <p:bgPr>
+        <a:solidFill>
+          <a:schemeClr val="accent2">
+            <a:lumMod val="40000"/>
+            <a:lumOff val="60000"/>
+          </a:schemeClr>
+        </a:solidFill>
+        <a:effectLst/>
+      </p:bgPr>
+    </p:bg>
+    <p:spTree>
+      <p:nvGrpSpPr>
+        <p:cNvPr id="1" name=""/>
+        <p:cNvGrpSpPr/>
+        <p:nvPr/>
+      </p:nvGrpSpPr>
+      <p:grpSpPr>
+        <a:xfrm>
+          <a:off x="0" y="0"/>
+          <a:ext cx="0" cy="0"/>
+          <a:chOff x="0" y="0"/>
+          <a:chExt cx="0" cy="0"/>
+        </a:xfrm>
+      </p:grpSpPr>
+      <p:sp>
+        <p:nvSpPr>
+          <p:cNvPr id="2" name="Titre 1">
+            <a:extLst>
+              <a:ext uri="{FF2B5EF4-FFF2-40B4-BE49-F238E27FC236}">
+                <a16:creationId xmlns:a16="http://schemas.microsoft.com/office/drawing/2014/main" id="{173A5FD7-5E5B-4F12-BA5C-1AB6C6DA9F1E}"/>
+              </a:ext>
+            </a:extLst>
+          </p:cNvPr>
+          <p:cNvSpPr>
+            <a:spLocks noGrp="1"/>
+          </p:cNvSpPr>
+          <p:nvPr>
+            <p:ph type="title"/>
+          </p:nvPr>
+        </p:nvSpPr>
+        <p:spPr>
+          <a:xfrm>
+            <a:off x="838200" y="365125"/>
+            <a:ext cx="11189677" cy="1325563"/>
+          </a:xfrm>
+        </p:spPr>
+        <p:txBody>
+          <a:bodyPr/>
+          <a:lstStyle/>
+          <a:p>
+            <a:r>
+              <a:rPr lang="fr-FR" altLang="fr-FR" b="1" dirty="0">
+                <a:latin typeface="Calibri" panose="020F0502020204030204" pitchFamily="34" charset="0"/>
+                <a:cs typeface="Times New Roman" panose="02020603050405020304" pitchFamily="18" charset="0"/>
+              </a:rPr>
+              <a:t>Aide &amp; FAQ </a:t>
+            </a:r>
+            <a:r>
+              <a:rPr lang="fr-FR" altLang="fr-FR" b="1" dirty="0">
+                <a:latin typeface="Calibri" panose="020F0502020204030204" pitchFamily="34" charset="0"/>
+                <a:ea typeface="Calibri" panose="020F0502020204030204" pitchFamily="34" charset="0"/>
+                <a:cs typeface="Times New Roman" panose="02020603050405020304" pitchFamily="18" charset="0"/>
+              </a:rPr>
+              <a:t>: </a:t>
+            </a:r>
+            <a:r>
+              <a:rPr lang="fr-FR" altLang="fr-FR" dirty="0">
+                <a:latin typeface="Calibri" panose="020F0502020204030204" pitchFamily="34" charset="0"/>
+                <a:ea typeface="Calibri" panose="020F0502020204030204" pitchFamily="34" charset="0"/>
+                <a:cs typeface="Times New Roman" panose="02020603050405020304" pitchFamily="18" charset="0"/>
+              </a:rPr>
+              <a:t>Louer un bus</a:t>
+            </a:r>
+            <a:endParaRPr lang="fr-FR" dirty="0"/>
+          </a:p>
+        </p:txBody>
+      </p:sp>
+      <p:sp>
+        <p:nvSpPr>
+          <p:cNvPr id="3" name="ZoneTexte 2">
+            <a:extLst>
+              <a:ext uri="{FF2B5EF4-FFF2-40B4-BE49-F238E27FC236}">
+                <a16:creationId xmlns:a16="http://schemas.microsoft.com/office/drawing/2014/main" id="{027CB3A8-775D-4714-BF00-99753B6C6F79}"/>
+              </a:ext>
+            </a:extLst>
+          </p:cNvPr>
+          <p:cNvSpPr txBox="1"/>
+          <p:nvPr/>
+        </p:nvSpPr>
+        <p:spPr>
+          <a:xfrm>
+            <a:off x="1026941" y="1690688"/>
+            <a:ext cx="10522633" cy="1477328"/>
+          </a:xfrm>
+          <a:prstGeom prst="rect">
+            <a:avLst/>
+          </a:prstGeom>
+          <a:noFill/>
+        </p:spPr>
+        <p:txBody>
+          <a:bodyPr wrap="square" rtlCol="0">
+            <a:spAutoFit/>
+          </a:bodyPr>
+          <a:lstStyle/>
+          <a:p>
+            <a:pPr marL="285750" indent="-285750">
+              <a:buFont typeface="Arial" panose="020B0604020202020204" pitchFamily="34" charset="0"/>
+              <a:buChar char="•"/>
+            </a:pPr>
+            <a:r>
+              <a:rPr lang="fr-FR" dirty="0"/>
+              <a:t>Section entrée des données pour la réservation</a:t>
+            </a:r>
+          </a:p>
+          <a:p>
+            <a:pPr marL="285750" indent="-285750">
+              <a:buFont typeface="Arial" panose="020B0604020202020204" pitchFamily="34" charset="0"/>
+              <a:buChar char="•"/>
+            </a:pPr>
+            <a:r>
+              <a:rPr lang="fr-FR" dirty="0"/>
+              <a:t>Section avantage du service de réservation son propre bus </a:t>
+            </a:r>
+          </a:p>
+          <a:p>
+            <a:pPr marL="285750" indent="-285750">
+              <a:buFont typeface="Arial" panose="020B0604020202020204" pitchFamily="34" charset="0"/>
+              <a:buChar char="•"/>
+            </a:pPr>
+            <a:r>
+              <a:rPr lang="fr-FR" dirty="0"/>
+              <a:t>Section témoignage des anciens clients</a:t>
+            </a:r>
+          </a:p>
+          <a:p>
+            <a:pPr marL="285750" indent="-285750">
+              <a:buFont typeface="Arial" panose="020B0604020202020204" pitchFamily="34" charset="0"/>
+              <a:buChar char="•"/>
+            </a:pPr>
+            <a:r>
+              <a:rPr lang="fr-FR" dirty="0"/>
+              <a:t>Section comment ça marche </a:t>
+            </a:r>
+          </a:p>
+          <a:p>
+            <a:pPr marL="285750" indent="-285750">
+              <a:buFont typeface="Arial" panose="020B0604020202020204" pitchFamily="34" charset="0"/>
+              <a:buChar char="•"/>
+            </a:pPr>
+            <a:r>
+              <a:rPr lang="fr-FR" dirty="0"/>
+              <a:t>Le pied de page</a:t>
+            </a:r>
+          </a:p>
+        </p:txBody>
+      </p:sp>
+    </p:spTree>
+    <p:extLst>
+      <p:ext uri="{BB962C8B-B14F-4D97-AF65-F5344CB8AC3E}">
+        <p14:creationId xmlns:p14="http://schemas.microsoft.com/office/powerpoint/2010/main" val="2086402098"/>
+      </p:ext>
+    </p:extLst>
+  </p:cSld>
+  <p:clrMapOvr>
+    <a:masterClrMapping/>
+  </p:clrMapOvr>
+</p:sld>
+</file>
+
+<file path=ppt/slides/slide13.xml><?xml version="1.0" encoding="utf-8"?>
+<p:sld xmlns:a="http://schemas.openxmlformats.org/drawingml/2006/main" xmlns:r="http://schemas.openxmlformats.org/officeDocument/2006/relationships" xmlns:p="http://schemas.openxmlformats.org/presentationml/2006/main">
+  <p:cSld>
+    <p:bg>
+      <p:bgPr>
+        <a:solidFill>
+          <a:schemeClr val="accent3"/>
+        </a:solidFill>
+        <a:effectLst/>
+      </p:bgPr>
+    </p:bg>
+    <p:spTree>
+      <p:nvGrpSpPr>
+        <p:cNvPr id="1" name=""/>
+        <p:cNvGrpSpPr/>
+        <p:nvPr/>
+      </p:nvGrpSpPr>
+      <p:grpSpPr>
+        <a:xfrm>
+          <a:off x="0" y="0"/>
+          <a:ext cx="0" cy="0"/>
+          <a:chOff x="0" y="0"/>
+          <a:chExt cx="0" cy="0"/>
+        </a:xfrm>
+      </p:grpSpPr>
+      <p:sp>
+        <p:nvSpPr>
+          <p:cNvPr id="2" name="Titre 1">
+            <a:extLst>
+              <a:ext uri="{FF2B5EF4-FFF2-40B4-BE49-F238E27FC236}">
+                <a16:creationId xmlns:a16="http://schemas.microsoft.com/office/drawing/2014/main" id="{173A5FD7-5E5B-4F12-BA5C-1AB6C6DA9F1E}"/>
+              </a:ext>
+            </a:extLst>
+          </p:cNvPr>
+          <p:cNvSpPr>
+            <a:spLocks noGrp="1"/>
+          </p:cNvSpPr>
+          <p:nvPr>
+            <p:ph type="title"/>
+          </p:nvPr>
+        </p:nvSpPr>
+        <p:spPr>
+          <a:xfrm>
+            <a:off x="838200" y="365125"/>
+            <a:ext cx="11189677" cy="1325563"/>
+          </a:xfrm>
+        </p:spPr>
+        <p:txBody>
+          <a:bodyPr/>
+          <a:lstStyle/>
+          <a:p>
+            <a:r>
+              <a:rPr lang="fr-FR" altLang="fr-FR" b="1" dirty="0">
+                <a:latin typeface="Calibri" panose="020F0502020204030204" pitchFamily="34" charset="0"/>
+                <a:cs typeface="Times New Roman" panose="02020603050405020304" pitchFamily="18" charset="0"/>
+              </a:rPr>
+              <a:t>LOG-IN </a:t>
+            </a:r>
+            <a:r>
+              <a:rPr lang="fr-FR" altLang="fr-FR" b="1" dirty="0">
+                <a:latin typeface="Calibri" panose="020F0502020204030204" pitchFamily="34" charset="0"/>
+                <a:ea typeface="Calibri" panose="020F0502020204030204" pitchFamily="34" charset="0"/>
+                <a:cs typeface="Times New Roman" panose="02020603050405020304" pitchFamily="18" charset="0"/>
+              </a:rPr>
+              <a:t>: </a:t>
+            </a:r>
+            <a:r>
+              <a:rPr lang="fr-FR" altLang="fr-FR" dirty="0">
+                <a:latin typeface="Calibri" panose="020F0502020204030204" pitchFamily="34" charset="0"/>
+                <a:ea typeface="Calibri" panose="020F0502020204030204" pitchFamily="34" charset="0"/>
+                <a:cs typeface="Times New Roman" panose="02020603050405020304" pitchFamily="18" charset="0"/>
+              </a:rPr>
+              <a:t>Louer un bus</a:t>
+            </a:r>
+            <a:endParaRPr lang="fr-FR" dirty="0"/>
+          </a:p>
+        </p:txBody>
+      </p:sp>
+      <p:sp>
+        <p:nvSpPr>
+          <p:cNvPr id="3" name="ZoneTexte 2">
+            <a:extLst>
+              <a:ext uri="{FF2B5EF4-FFF2-40B4-BE49-F238E27FC236}">
+                <a16:creationId xmlns:a16="http://schemas.microsoft.com/office/drawing/2014/main" id="{027CB3A8-775D-4714-BF00-99753B6C6F79}"/>
+              </a:ext>
+            </a:extLst>
+          </p:cNvPr>
+          <p:cNvSpPr txBox="1"/>
+          <p:nvPr/>
+        </p:nvSpPr>
+        <p:spPr>
+          <a:xfrm>
+            <a:off x="1026941" y="1690688"/>
+            <a:ext cx="10522633" cy="1477328"/>
+          </a:xfrm>
+          <a:prstGeom prst="rect">
+            <a:avLst/>
+          </a:prstGeom>
+          <a:noFill/>
+        </p:spPr>
+        <p:txBody>
+          <a:bodyPr wrap="square" rtlCol="0">
+            <a:spAutoFit/>
+          </a:bodyPr>
+          <a:lstStyle/>
+          <a:p>
+            <a:pPr marL="285750" indent="-285750">
+              <a:buFont typeface="Arial" panose="020B0604020202020204" pitchFamily="34" charset="0"/>
+              <a:buChar char="•"/>
+            </a:pPr>
+            <a:r>
+              <a:rPr lang="fr-FR" dirty="0"/>
+              <a:t>Section entrée des données pour la réservation</a:t>
+            </a:r>
+          </a:p>
+          <a:p>
+            <a:pPr marL="285750" indent="-285750">
+              <a:buFont typeface="Arial" panose="020B0604020202020204" pitchFamily="34" charset="0"/>
+              <a:buChar char="•"/>
+            </a:pPr>
+            <a:r>
+              <a:rPr lang="fr-FR" dirty="0"/>
+              <a:t>Section avantage du service de réservation son propre bus </a:t>
+            </a:r>
+          </a:p>
+          <a:p>
+            <a:pPr marL="285750" indent="-285750">
+              <a:buFont typeface="Arial" panose="020B0604020202020204" pitchFamily="34" charset="0"/>
+              <a:buChar char="•"/>
+            </a:pPr>
+            <a:r>
+              <a:rPr lang="fr-FR" dirty="0"/>
+              <a:t>Section témoignage des anciens clients</a:t>
+            </a:r>
+          </a:p>
+          <a:p>
+            <a:pPr marL="285750" indent="-285750">
+              <a:buFont typeface="Arial" panose="020B0604020202020204" pitchFamily="34" charset="0"/>
+              <a:buChar char="•"/>
+            </a:pPr>
+            <a:r>
+              <a:rPr lang="fr-FR" dirty="0"/>
+              <a:t>Section comment ça marche </a:t>
+            </a:r>
+          </a:p>
+          <a:p>
+            <a:pPr marL="285750" indent="-285750">
+              <a:buFont typeface="Arial" panose="020B0604020202020204" pitchFamily="34" charset="0"/>
+              <a:buChar char="•"/>
+            </a:pPr>
+            <a:r>
+              <a:rPr lang="fr-FR" dirty="0"/>
+              <a:t>Le pied de page</a:t>
+            </a:r>
+          </a:p>
+        </p:txBody>
+      </p:sp>
+    </p:spTree>
+    <p:extLst>
+      <p:ext uri="{BB962C8B-B14F-4D97-AF65-F5344CB8AC3E}">
+        <p14:creationId xmlns:p14="http://schemas.microsoft.com/office/powerpoint/2010/main" val="4294409896"/>
+      </p:ext>
+    </p:extLst>
+  </p:cSld>
+  <p:clrMapOvr>
+    <a:masterClrMapping/>
+  </p:clrMapOvr>
+</p:sld>
+</file>
+
+<file path=ppt/slides/slide2.xml><?xml version="1.0" encoding="utf-8"?>
+<p:sld xmlns:a="http://schemas.openxmlformats.org/drawingml/2006/main" xmlns:r="http://schemas.openxmlformats.org/officeDocument/2006/relationships" xmlns:p="http://schemas.openxmlformats.org/presentationml/2006/main">
+  <p:cSld>
+    <p:bg>
+      <p:bgPr>
+        <a:solidFill>
+          <a:srgbClr val="FF0000">
+            <a:alpha val="50000"/>
+          </a:srgbClr>
+        </a:solidFill>
+        <a:effectLst/>
+      </p:bgPr>
+    </p:bg>
+    <p:spTree>
+      <p:nvGrpSpPr>
+        <p:cNvPr id="1" name=""/>
+        <p:cNvGrpSpPr/>
+        <p:nvPr/>
+      </p:nvGrpSpPr>
+      <p:grpSpPr>
+        <a:xfrm>
+          <a:off x="0" y="0"/>
+          <a:ext cx="0" cy="0"/>
+          <a:chOff x="0" y="0"/>
+          <a:chExt cx="0" cy="0"/>
+        </a:xfrm>
+      </p:grpSpPr>
+      <p:sp>
+        <p:nvSpPr>
+          <p:cNvPr id="2" name="Titre 1">
+            <a:extLst>
+              <a:ext uri="{FF2B5EF4-FFF2-40B4-BE49-F238E27FC236}">
+                <a16:creationId xmlns:a16="http://schemas.microsoft.com/office/drawing/2014/main" id="{173A5FD7-5E5B-4F12-BA5C-1AB6C6DA9F1E}"/>
+              </a:ext>
+            </a:extLst>
+          </p:cNvPr>
+          <p:cNvSpPr>
+            <a:spLocks noGrp="1"/>
+          </p:cNvSpPr>
+          <p:nvPr>
+            <p:ph type="title"/>
+          </p:nvPr>
+        </p:nvSpPr>
         <p:spPr/>
         <p:txBody>
           <a:bodyPr/>
@@ -5683,7 +6392,7 @@
             </a:pPr>
             <a:r>
               <a:rPr lang="fr-FR" dirty="0"/>
-              <a:t>Contient la barre de menu</a:t>
+              <a:t>Barre de menu</a:t>
             </a:r>
           </a:p>
           <a:p>
@@ -5693,7 +6402,7 @@
             </a:pPr>
             <a:r>
               <a:rPr lang="fr-FR" dirty="0"/>
-              <a:t>Section barre de recherche de bus</a:t>
+              <a:t>Section recherche de bus</a:t>
             </a:r>
           </a:p>
           <a:p>
@@ -5703,7 +6412,7 @@
             </a:pPr>
             <a:r>
               <a:rPr lang="fr-FR" dirty="0"/>
-              <a:t>Section bonus actuelle</a:t>
+              <a:t>Section bonus et promotion actuels</a:t>
             </a:r>
           </a:p>
           <a:p>
@@ -5723,7 +6432,7 @@
             </a:pPr>
             <a:r>
               <a:rPr lang="fr-FR" dirty="0"/>
-              <a:t>Le pied de page</a:t>
+              <a:t>Pied de page</a:t>
             </a:r>
           </a:p>
         </p:txBody>
@@ -5744,6 +6453,14 @@
 <file path=ppt/slides/slide3.xml><?xml version="1.0" encoding="utf-8"?>
 <p:sld xmlns:a="http://schemas.openxmlformats.org/drawingml/2006/main" xmlns:r="http://schemas.openxmlformats.org/officeDocument/2006/relationships" xmlns:p="http://schemas.openxmlformats.org/presentationml/2006/main">
   <p:cSld>
+    <p:bg>
+      <p:bgPr>
+        <a:solidFill>
+          <a:srgbClr val="92D050"/>
+        </a:solidFill>
+        <a:effectLst/>
+      </p:bgPr>
+    </p:bg>
     <p:spTree>
       <p:nvGrpSpPr>
         <p:cNvPr id="1" name=""/>
@@ -5825,7 +6542,7 @@
             </a:pPr>
             <a:r>
               <a:rPr lang="fr-FR" dirty="0"/>
-              <a:t>Section barre de recherche de bus</a:t>
+              <a:t>Section recherche de bus</a:t>
             </a:r>
           </a:p>
           <a:p>
@@ -5845,7 +6562,7 @@
             </a:pPr>
             <a:r>
               <a:rPr lang="fr-FR" dirty="0"/>
-              <a:t>Le pied de page</a:t>
+              <a:t>Pied de page</a:t>
             </a:r>
           </a:p>
         </p:txBody>
@@ -5866,6 +6583,14 @@
 <file path=ppt/slides/slide4.xml><?xml version="1.0" encoding="utf-8"?>
 <p:sld xmlns:a="http://schemas.openxmlformats.org/drawingml/2006/main" xmlns:r="http://schemas.openxmlformats.org/officeDocument/2006/relationships" xmlns:p="http://schemas.openxmlformats.org/presentationml/2006/main">
   <p:cSld>
+    <p:bg>
+      <p:bgPr>
+        <a:solidFill>
+          <a:srgbClr val="92D050"/>
+        </a:solidFill>
+        <a:effectLst/>
+      </p:bgPr>
+    </p:bg>
     <p:spTree>
       <p:nvGrpSpPr>
         <p:cNvPr id="1" name=""/>
@@ -5962,21 +6687,8 @@
             </a:pPr>
             <a:r>
               <a:rPr lang="fr-FR" dirty="0"/>
-              <a:t>Section toutes les destinations possibles : google </a:t>
-            </a:r>
-            <a:r>
-              <a:rPr lang="fr-FR" dirty="0" err="1"/>
-              <a:t>maps</a:t>
-            </a:r>
-            <a:r>
-              <a:rPr lang="fr-FR" dirty="0"/>
-              <a:t> </a:t>
-            </a:r>
-            <a:r>
-              <a:rPr lang="fr-FR" dirty="0" err="1"/>
-              <a:t>slider</a:t>
-            </a:r>
-            <a:endParaRPr lang="fr-FR" dirty="0"/>
+              <a:t>Section recherches destinations possibles </a:t>
+            </a:r>
           </a:p>
           <a:p>
             <a:pPr marL="285750" indent="-285750">
@@ -6006,6 +6718,14 @@
 <file path=ppt/slides/slide5.xml><?xml version="1.0" encoding="utf-8"?>
 <p:sld xmlns:a="http://schemas.openxmlformats.org/drawingml/2006/main" xmlns:r="http://schemas.openxmlformats.org/officeDocument/2006/relationships" xmlns:p="http://schemas.openxmlformats.org/presentationml/2006/main">
   <p:cSld>
+    <p:bg>
+      <p:bgPr>
+        <a:solidFill>
+          <a:srgbClr val="92D050"/>
+        </a:solidFill>
+        <a:effectLst/>
+      </p:bgPr>
+    </p:bg>
     <p:spTree>
       <p:nvGrpSpPr>
         <p:cNvPr id="1" name=""/>
@@ -6073,7 +6793,7 @@
         <p:spPr>
           <a:xfrm>
             <a:off x="1026941" y="1690688"/>
-            <a:ext cx="10522633" cy="923330"/>
+            <a:ext cx="10522633" cy="1200329"/>
           </a:xfrm>
           <a:prstGeom prst="rect">
             <a:avLst/>
@@ -6121,6 +6841,16 @@
             <a:r>
               <a:rPr lang="fr-FR" dirty="0"/>
               <a:t>Section recherche ville  + gare dispo dans chaque ville</a:t>
+            </a:r>
+          </a:p>
+          <a:p>
+            <a:pPr marL="285750" indent="-285750">
+              <a:buFont typeface="Arial" panose="020B0604020202020204" pitchFamily="34" charset="0"/>
+              <a:buChar char="•"/>
+            </a:pPr>
+            <a:r>
+              <a:rPr lang="fr-FR" dirty="0"/>
+              <a:t>Le pied de page</a:t>
             </a:r>
           </a:p>
         </p:txBody>
@@ -6141,6 +6871,14 @@
 <file path=ppt/slides/slide6.xml><?xml version="1.0" encoding="utf-8"?>
 <p:sld xmlns:a="http://schemas.openxmlformats.org/drawingml/2006/main" xmlns:r="http://schemas.openxmlformats.org/officeDocument/2006/relationships" xmlns:p="http://schemas.openxmlformats.org/presentationml/2006/main">
   <p:cSld>
+    <p:bg>
+      <p:bgPr>
+        <a:solidFill>
+          <a:srgbClr val="FFC000"/>
+        </a:solidFill>
+        <a:effectLst/>
+      </p:bgPr>
+    </p:bg>
     <p:spTree>
       <p:nvGrpSpPr>
         <p:cNvPr id="1" name=""/>
@@ -6242,15 +6980,7 @@
             </a:pPr>
             <a:r>
               <a:rPr lang="fr-FR" dirty="0"/>
-              <a:t>Section présentation rapide des principales compagnies : UTB, UTS, STIF, </a:t>
-            </a:r>
-            <a:r>
-              <a:rPr lang="fr-FR" dirty="0" err="1"/>
-              <a:t>Leopard</a:t>
-            </a:r>
-            <a:r>
-              <a:rPr lang="fr-FR" dirty="0"/>
-              <a:t>…</a:t>
+              <a:t>Section modification de la réservation avec les conditions</a:t>
             </a:r>
           </a:p>
           <a:p>
@@ -6260,7 +6990,7 @@
             </a:pPr>
             <a:r>
               <a:rPr lang="fr-FR" dirty="0"/>
-              <a:t>Section bar de recherche de compagnies</a:t>
+              <a:t>Section Annulation de la réservation avec les conditions</a:t>
             </a:r>
           </a:p>
           <a:p>
@@ -6270,7 +7000,7 @@
             </a:pPr>
             <a:r>
               <a:rPr lang="fr-FR" dirty="0"/>
-              <a:t>Section recherche ville  + gare dispo dans chaque ville</a:t>
+              <a:t>Le pied de page</a:t>
             </a:r>
           </a:p>
         </p:txBody>
@@ -6279,6 +7009,496 @@
     <p:extLst>
       <p:ext uri="{BB962C8B-B14F-4D97-AF65-F5344CB8AC3E}">
         <p14:creationId xmlns:p14="http://schemas.microsoft.com/office/powerpoint/2010/main" val="3364710369"/>
+      </p:ext>
+    </p:extLst>
+  </p:cSld>
+  <p:clrMapOvr>
+    <a:masterClrMapping/>
+  </p:clrMapOvr>
+</p:sld>
+</file>
+
+<file path=ppt/slides/slide7.xml><?xml version="1.0" encoding="utf-8"?>
+<p:sld xmlns:a="http://schemas.openxmlformats.org/drawingml/2006/main" xmlns:r="http://schemas.openxmlformats.org/officeDocument/2006/relationships" xmlns:p="http://schemas.openxmlformats.org/presentationml/2006/main">
+  <p:cSld>
+    <p:bg>
+      <p:bgPr>
+        <a:solidFill>
+          <a:srgbClr val="FFC000"/>
+        </a:solidFill>
+        <a:effectLst/>
+      </p:bgPr>
+    </p:bg>
+    <p:spTree>
+      <p:nvGrpSpPr>
+        <p:cNvPr id="1" name=""/>
+        <p:cNvGrpSpPr/>
+        <p:nvPr/>
+      </p:nvGrpSpPr>
+      <p:grpSpPr>
+        <a:xfrm>
+          <a:off x="0" y="0"/>
+          <a:ext cx="0" cy="0"/>
+          <a:chOff x="0" y="0"/>
+          <a:chExt cx="0" cy="0"/>
+        </a:xfrm>
+      </p:grpSpPr>
+      <p:sp>
+        <p:nvSpPr>
+          <p:cNvPr id="2" name="Titre 1">
+            <a:extLst>
+              <a:ext uri="{FF2B5EF4-FFF2-40B4-BE49-F238E27FC236}">
+                <a16:creationId xmlns:a16="http://schemas.microsoft.com/office/drawing/2014/main" id="{173A5FD7-5E5B-4F12-BA5C-1AB6C6DA9F1E}"/>
+              </a:ext>
+            </a:extLst>
+          </p:cNvPr>
+          <p:cNvSpPr>
+            <a:spLocks noGrp="1"/>
+          </p:cNvSpPr>
+          <p:nvPr>
+            <p:ph type="title"/>
+          </p:nvPr>
+        </p:nvSpPr>
+        <p:spPr>
+          <a:xfrm>
+            <a:off x="838200" y="365125"/>
+            <a:ext cx="11189677" cy="1325563"/>
+          </a:xfrm>
+        </p:spPr>
+        <p:txBody>
+          <a:bodyPr/>
+          <a:lstStyle/>
+          <a:p>
+            <a:r>
+              <a:rPr lang="fr-FR" altLang="fr-FR" b="1" dirty="0">
+                <a:latin typeface="Calibri" panose="020F0502020204030204" pitchFamily="34" charset="0"/>
+                <a:cs typeface="Times New Roman" panose="02020603050405020304" pitchFamily="18" charset="0"/>
+              </a:rPr>
+              <a:t>Services izyGO </a:t>
+            </a:r>
+            <a:r>
+              <a:rPr lang="fr-FR" altLang="fr-FR" b="1" dirty="0">
+                <a:latin typeface="Calibri" panose="020F0502020204030204" pitchFamily="34" charset="0"/>
+                <a:ea typeface="Calibri" panose="020F0502020204030204" pitchFamily="34" charset="0"/>
+                <a:cs typeface="Times New Roman" panose="02020603050405020304" pitchFamily="18" charset="0"/>
+              </a:rPr>
+              <a:t>: </a:t>
+            </a:r>
+            <a:r>
+              <a:rPr lang="fr-FR" altLang="fr-FR" dirty="0">
+                <a:latin typeface="Calibri" panose="020F0502020204030204" pitchFamily="34" charset="0"/>
+                <a:ea typeface="Calibri" panose="020F0502020204030204" pitchFamily="34" charset="0"/>
+                <a:cs typeface="Times New Roman" panose="02020603050405020304" pitchFamily="18" charset="0"/>
+              </a:rPr>
+              <a:t>Points de ventes</a:t>
+            </a:r>
+            <a:endParaRPr lang="fr-FR" dirty="0"/>
+          </a:p>
+        </p:txBody>
+      </p:sp>
+      <p:sp>
+        <p:nvSpPr>
+          <p:cNvPr id="3" name="ZoneTexte 2">
+            <a:extLst>
+              <a:ext uri="{FF2B5EF4-FFF2-40B4-BE49-F238E27FC236}">
+                <a16:creationId xmlns:a16="http://schemas.microsoft.com/office/drawing/2014/main" id="{027CB3A8-775D-4714-BF00-99753B6C6F79}"/>
+              </a:ext>
+            </a:extLst>
+          </p:cNvPr>
+          <p:cNvSpPr txBox="1"/>
+          <p:nvPr/>
+        </p:nvSpPr>
+        <p:spPr>
+          <a:xfrm>
+            <a:off x="1026941" y="1690688"/>
+            <a:ext cx="10522633" cy="923330"/>
+          </a:xfrm>
+          <a:prstGeom prst="rect">
+            <a:avLst/>
+          </a:prstGeom>
+          <a:noFill/>
+        </p:spPr>
+        <p:txBody>
+          <a:bodyPr wrap="square" rtlCol="0">
+            <a:spAutoFit/>
+          </a:bodyPr>
+          <a:lstStyle/>
+          <a:p>
+            <a:pPr marL="285750" indent="-285750">
+              <a:buFont typeface="Arial" panose="020B0604020202020204" pitchFamily="34" charset="0"/>
+              <a:buChar char="•"/>
+            </a:pPr>
+            <a:r>
+              <a:rPr lang="fr-FR" dirty="0"/>
+              <a:t>Section présentation rapide des principaux points de ventes</a:t>
+            </a:r>
+          </a:p>
+          <a:p>
+            <a:pPr marL="285750" indent="-285750">
+              <a:buFont typeface="Arial" panose="020B0604020202020204" pitchFamily="34" charset="0"/>
+              <a:buChar char="•"/>
+            </a:pPr>
+            <a:r>
+              <a:rPr lang="fr-FR" dirty="0"/>
+              <a:t>Section recherche de points de ventes avec slider maps</a:t>
+            </a:r>
+          </a:p>
+          <a:p>
+            <a:pPr marL="285750" indent="-285750">
+              <a:buFont typeface="Arial" panose="020B0604020202020204" pitchFamily="34" charset="0"/>
+              <a:buChar char="•"/>
+            </a:pPr>
+            <a:r>
+              <a:rPr lang="fr-FR" dirty="0"/>
+              <a:t>Le pied de page</a:t>
+            </a:r>
+          </a:p>
+        </p:txBody>
+      </p:sp>
+    </p:spTree>
+    <p:extLst>
+      <p:ext uri="{BB962C8B-B14F-4D97-AF65-F5344CB8AC3E}">
+        <p14:creationId xmlns:p14="http://schemas.microsoft.com/office/powerpoint/2010/main" val="2367907844"/>
+      </p:ext>
+    </p:extLst>
+  </p:cSld>
+  <p:clrMapOvr>
+    <a:masterClrMapping/>
+  </p:clrMapOvr>
+</p:sld>
+</file>
+
+<file path=ppt/slides/slide8.xml><?xml version="1.0" encoding="utf-8"?>
+<p:sld xmlns:a="http://schemas.openxmlformats.org/drawingml/2006/main" xmlns:r="http://schemas.openxmlformats.org/officeDocument/2006/relationships" xmlns:p="http://schemas.openxmlformats.org/presentationml/2006/main">
+  <p:cSld>
+    <p:bg>
+      <p:bgPr>
+        <a:solidFill>
+          <a:srgbClr val="FFC000"/>
+        </a:solidFill>
+        <a:effectLst/>
+      </p:bgPr>
+    </p:bg>
+    <p:spTree>
+      <p:nvGrpSpPr>
+        <p:cNvPr id="1" name=""/>
+        <p:cNvGrpSpPr/>
+        <p:nvPr/>
+      </p:nvGrpSpPr>
+      <p:grpSpPr>
+        <a:xfrm>
+          <a:off x="0" y="0"/>
+          <a:ext cx="0" cy="0"/>
+          <a:chOff x="0" y="0"/>
+          <a:chExt cx="0" cy="0"/>
+        </a:xfrm>
+      </p:grpSpPr>
+      <p:sp>
+        <p:nvSpPr>
+          <p:cNvPr id="2" name="Titre 1">
+            <a:extLst>
+              <a:ext uri="{FF2B5EF4-FFF2-40B4-BE49-F238E27FC236}">
+                <a16:creationId xmlns:a16="http://schemas.microsoft.com/office/drawing/2014/main" id="{173A5FD7-5E5B-4F12-BA5C-1AB6C6DA9F1E}"/>
+              </a:ext>
+            </a:extLst>
+          </p:cNvPr>
+          <p:cNvSpPr>
+            <a:spLocks noGrp="1"/>
+          </p:cNvSpPr>
+          <p:nvPr>
+            <p:ph type="title"/>
+          </p:nvPr>
+        </p:nvSpPr>
+        <p:spPr>
+          <a:xfrm>
+            <a:off x="838200" y="365125"/>
+            <a:ext cx="11189677" cy="1325563"/>
+          </a:xfrm>
+        </p:spPr>
+        <p:txBody>
+          <a:bodyPr/>
+          <a:lstStyle/>
+          <a:p>
+            <a:r>
+              <a:rPr lang="fr-FR" altLang="fr-FR" b="1" dirty="0">
+                <a:latin typeface="Calibri" panose="020F0502020204030204" pitchFamily="34" charset="0"/>
+                <a:cs typeface="Times New Roman" panose="02020603050405020304" pitchFamily="18" charset="0"/>
+              </a:rPr>
+              <a:t>Services izyGO </a:t>
+            </a:r>
+            <a:r>
+              <a:rPr lang="fr-FR" altLang="fr-FR" b="1" dirty="0">
+                <a:latin typeface="Calibri" panose="020F0502020204030204" pitchFamily="34" charset="0"/>
+                <a:ea typeface="Calibri" panose="020F0502020204030204" pitchFamily="34" charset="0"/>
+                <a:cs typeface="Times New Roman" panose="02020603050405020304" pitchFamily="18" charset="0"/>
+              </a:rPr>
+              <a:t>: </a:t>
+            </a:r>
+            <a:r>
+              <a:rPr lang="fr-FR" altLang="fr-FR" dirty="0">
+                <a:latin typeface="Calibri" panose="020F0502020204030204" pitchFamily="34" charset="0"/>
+                <a:ea typeface="Calibri" panose="020F0502020204030204" pitchFamily="34" charset="0"/>
+                <a:cs typeface="Times New Roman" panose="02020603050405020304" pitchFamily="18" charset="0"/>
+              </a:rPr>
+              <a:t>Louer un bus</a:t>
+            </a:r>
+            <a:endParaRPr lang="fr-FR" dirty="0"/>
+          </a:p>
+        </p:txBody>
+      </p:sp>
+      <p:sp>
+        <p:nvSpPr>
+          <p:cNvPr id="3" name="ZoneTexte 2">
+            <a:extLst>
+              <a:ext uri="{FF2B5EF4-FFF2-40B4-BE49-F238E27FC236}">
+                <a16:creationId xmlns:a16="http://schemas.microsoft.com/office/drawing/2014/main" id="{027CB3A8-775D-4714-BF00-99753B6C6F79}"/>
+              </a:ext>
+            </a:extLst>
+          </p:cNvPr>
+          <p:cNvSpPr txBox="1"/>
+          <p:nvPr/>
+        </p:nvSpPr>
+        <p:spPr>
+          <a:xfrm>
+            <a:off x="1026941" y="1690688"/>
+            <a:ext cx="10522633" cy="1477328"/>
+          </a:xfrm>
+          <a:prstGeom prst="rect">
+            <a:avLst/>
+          </a:prstGeom>
+          <a:noFill/>
+        </p:spPr>
+        <p:txBody>
+          <a:bodyPr wrap="square" rtlCol="0">
+            <a:spAutoFit/>
+          </a:bodyPr>
+          <a:lstStyle/>
+          <a:p>
+            <a:pPr marL="285750" indent="-285750">
+              <a:buFont typeface="Arial" panose="020B0604020202020204" pitchFamily="34" charset="0"/>
+              <a:buChar char="•"/>
+            </a:pPr>
+            <a:r>
+              <a:rPr lang="fr-FR" dirty="0"/>
+              <a:t>Section entrée des données pour la réservation</a:t>
+            </a:r>
+          </a:p>
+          <a:p>
+            <a:pPr marL="285750" indent="-285750">
+              <a:buFont typeface="Arial" panose="020B0604020202020204" pitchFamily="34" charset="0"/>
+              <a:buChar char="•"/>
+            </a:pPr>
+            <a:r>
+              <a:rPr lang="fr-FR" dirty="0"/>
+              <a:t>Section avantage du service de réservation son propre bus </a:t>
+            </a:r>
+          </a:p>
+          <a:p>
+            <a:pPr marL="285750" indent="-285750">
+              <a:buFont typeface="Arial" panose="020B0604020202020204" pitchFamily="34" charset="0"/>
+              <a:buChar char="•"/>
+            </a:pPr>
+            <a:r>
+              <a:rPr lang="fr-FR" dirty="0"/>
+              <a:t>Section témoignage des anciens clients</a:t>
+            </a:r>
+          </a:p>
+          <a:p>
+            <a:pPr marL="285750" indent="-285750">
+              <a:buFont typeface="Arial" panose="020B0604020202020204" pitchFamily="34" charset="0"/>
+              <a:buChar char="•"/>
+            </a:pPr>
+            <a:r>
+              <a:rPr lang="fr-FR" dirty="0"/>
+              <a:t>Section comment ça marche </a:t>
+            </a:r>
+          </a:p>
+          <a:p>
+            <a:pPr marL="285750" indent="-285750">
+              <a:buFont typeface="Arial" panose="020B0604020202020204" pitchFamily="34" charset="0"/>
+              <a:buChar char="•"/>
+            </a:pPr>
+            <a:r>
+              <a:rPr lang="fr-FR" dirty="0"/>
+              <a:t>Le pied de page</a:t>
+            </a:r>
+          </a:p>
+        </p:txBody>
+      </p:sp>
+    </p:spTree>
+    <p:extLst>
+      <p:ext uri="{BB962C8B-B14F-4D97-AF65-F5344CB8AC3E}">
+        <p14:creationId xmlns:p14="http://schemas.microsoft.com/office/powerpoint/2010/main" val="2535262240"/>
+      </p:ext>
+    </p:extLst>
+  </p:cSld>
+  <p:clrMapOvr>
+    <a:masterClrMapping/>
+  </p:clrMapOvr>
+</p:sld>
+</file>
+
+<file path=ppt/slides/slide9.xml><?xml version="1.0" encoding="utf-8"?>
+<p:sld xmlns:a="http://schemas.openxmlformats.org/drawingml/2006/main" xmlns:r="http://schemas.openxmlformats.org/officeDocument/2006/relationships" xmlns:p="http://schemas.openxmlformats.org/presentationml/2006/main">
+  <p:cSld>
+    <p:bg>
+      <p:bgPr>
+        <a:solidFill>
+          <a:srgbClr val="00B0F0"/>
+        </a:solidFill>
+        <a:effectLst/>
+      </p:bgPr>
+    </p:bg>
+    <p:spTree>
+      <p:nvGrpSpPr>
+        <p:cNvPr id="1" name=""/>
+        <p:cNvGrpSpPr/>
+        <p:nvPr/>
+      </p:nvGrpSpPr>
+      <p:grpSpPr>
+        <a:xfrm>
+          <a:off x="0" y="0"/>
+          <a:ext cx="0" cy="0"/>
+          <a:chOff x="0" y="0"/>
+          <a:chExt cx="0" cy="0"/>
+        </a:xfrm>
+      </p:grpSpPr>
+      <p:sp>
+        <p:nvSpPr>
+          <p:cNvPr id="2" name="Titre 1">
+            <a:extLst>
+              <a:ext uri="{FF2B5EF4-FFF2-40B4-BE49-F238E27FC236}">
+                <a16:creationId xmlns:a16="http://schemas.microsoft.com/office/drawing/2014/main" id="{173A5FD7-5E5B-4F12-BA5C-1AB6C6DA9F1E}"/>
+              </a:ext>
+            </a:extLst>
+          </p:cNvPr>
+          <p:cNvSpPr>
+            <a:spLocks noGrp="1"/>
+          </p:cNvSpPr>
+          <p:nvPr>
+            <p:ph type="title"/>
+          </p:nvPr>
+        </p:nvSpPr>
+        <p:spPr>
+          <a:xfrm>
+            <a:off x="838200" y="365125"/>
+            <a:ext cx="11189677" cy="1325563"/>
+          </a:xfrm>
+        </p:spPr>
+        <p:txBody>
+          <a:bodyPr/>
+          <a:lstStyle/>
+          <a:p>
+            <a:r>
+              <a:rPr lang="fr-FR" altLang="fr-FR" b="1" dirty="0">
+                <a:latin typeface="Calibri" panose="020F0502020204030204" pitchFamily="34" charset="0"/>
+                <a:cs typeface="Times New Roman" panose="02020603050405020304" pitchFamily="18" charset="0"/>
+              </a:rPr>
+              <a:t>L’entreprise </a:t>
+            </a:r>
+            <a:r>
+              <a:rPr lang="fr-FR" altLang="fr-FR" b="1" dirty="0">
+                <a:latin typeface="Calibri" panose="020F0502020204030204" pitchFamily="34" charset="0"/>
+                <a:ea typeface="Calibri" panose="020F0502020204030204" pitchFamily="34" charset="0"/>
+                <a:cs typeface="Times New Roman" panose="02020603050405020304" pitchFamily="18" charset="0"/>
+              </a:rPr>
+              <a:t>: </a:t>
+            </a:r>
+            <a:r>
+              <a:rPr lang="fr-FR" altLang="fr-FR" dirty="0">
+                <a:latin typeface="Calibri" panose="020F0502020204030204" pitchFamily="34" charset="0"/>
+                <a:ea typeface="Calibri" panose="020F0502020204030204" pitchFamily="34" charset="0"/>
+                <a:cs typeface="Times New Roman" panose="02020603050405020304" pitchFamily="18" charset="0"/>
+              </a:rPr>
+              <a:t>Louer un bus</a:t>
+            </a:r>
+            <a:endParaRPr lang="fr-FR" dirty="0"/>
+          </a:p>
+        </p:txBody>
+      </p:sp>
+      <p:sp>
+        <p:nvSpPr>
+          <p:cNvPr id="3" name="ZoneTexte 2">
+            <a:extLst>
+              <a:ext uri="{FF2B5EF4-FFF2-40B4-BE49-F238E27FC236}">
+                <a16:creationId xmlns:a16="http://schemas.microsoft.com/office/drawing/2014/main" id="{027CB3A8-775D-4714-BF00-99753B6C6F79}"/>
+              </a:ext>
+            </a:extLst>
+          </p:cNvPr>
+          <p:cNvSpPr txBox="1"/>
+          <p:nvPr/>
+        </p:nvSpPr>
+        <p:spPr>
+          <a:xfrm>
+            <a:off x="1026941" y="1690688"/>
+            <a:ext cx="10522633" cy="1477328"/>
+          </a:xfrm>
+          <a:prstGeom prst="rect">
+            <a:avLst/>
+          </a:prstGeom>
+          <a:noFill/>
+        </p:spPr>
+        <p:txBody>
+          <a:bodyPr wrap="square" rtlCol="0">
+            <a:spAutoFit/>
+          </a:bodyPr>
+          <a:lstStyle/>
+          <a:p>
+            <a:pPr marL="285750" indent="-285750">
+              <a:buFont typeface="Arial" panose="020B0604020202020204" pitchFamily="34" charset="0"/>
+              <a:buChar char="•"/>
+            </a:pPr>
+            <a:r>
+              <a:rPr lang="fr-FR" dirty="0"/>
+              <a:t>Section entrée des données pour la réservation</a:t>
+            </a:r>
+          </a:p>
+          <a:p>
+            <a:pPr marL="285750" indent="-285750">
+              <a:buFont typeface="Arial" panose="020B0604020202020204" pitchFamily="34" charset="0"/>
+              <a:buChar char="•"/>
+            </a:pPr>
+            <a:r>
+              <a:rPr lang="fr-FR" dirty="0"/>
+              <a:t>Section avantage du service de réservation son propre bus </a:t>
+            </a:r>
+          </a:p>
+          <a:p>
+            <a:pPr marL="285750" indent="-285750">
+              <a:buFont typeface="Arial" panose="020B0604020202020204" pitchFamily="34" charset="0"/>
+              <a:buChar char="•"/>
+            </a:pPr>
+            <a:r>
+              <a:rPr lang="fr-FR" dirty="0"/>
+              <a:t>Section témoignage des anciens clients</a:t>
+            </a:r>
+          </a:p>
+          <a:p>
+            <a:pPr marL="285750" indent="-285750">
+              <a:buFont typeface="Arial" panose="020B0604020202020204" pitchFamily="34" charset="0"/>
+              <a:buChar char="•"/>
+            </a:pPr>
+            <a:r>
+              <a:rPr lang="fr-FR" dirty="0"/>
+              <a:t>Section comment ça marche </a:t>
+            </a:r>
+          </a:p>
+          <a:p>
+            <a:pPr marL="285750" indent="-285750">
+              <a:buFont typeface="Arial" panose="020B0604020202020204" pitchFamily="34" charset="0"/>
+              <a:buChar char="•"/>
+            </a:pPr>
+            <a:r>
+              <a:rPr lang="fr-FR" dirty="0"/>
+              <a:t>Le pied de page</a:t>
+            </a:r>
+          </a:p>
+        </p:txBody>
+      </p:sp>
+    </p:spTree>
+    <p:extLst>
+      <p:ext uri="{BB962C8B-B14F-4D97-AF65-F5344CB8AC3E}">
+        <p14:creationId xmlns:p14="http://schemas.microsoft.com/office/powerpoint/2010/main" val="2641649781"/>
       </p:ext>
     </p:extLst>
   </p:cSld>

</xml_diff>

<commit_message>
plan de site terminée
</commit_message>
<xml_diff>
--- a/plan du site.pptx
+++ b/plan du site.pptx
@@ -5668,33 +5668,25 @@
           </a:xfrm>
         </p:spPr>
         <p:txBody>
-          <a:bodyPr/>
-          <a:lstStyle/>
-          <a:p>
-            <a:r>
-              <a:rPr lang="fr-FR" altLang="fr-FR" b="1" dirty="0">
-                <a:latin typeface="Calibri" panose="020F0502020204030204" pitchFamily="34" charset="0"/>
+          <a:bodyPr>
+            <a:normAutofit/>
+          </a:bodyPr>
+          <a:lstStyle/>
+          <a:p>
+            <a:r>
+              <a:rPr lang="fr-FR" altLang="fr-FR" sz="3200" dirty="0">
                 <a:cs typeface="Times New Roman" panose="02020603050405020304" pitchFamily="18" charset="0"/>
               </a:rPr>
               <a:t>L’entreprise </a:t>
             </a:r>
             <a:r>
-              <a:rPr lang="fr-FR" altLang="fr-FR" b="1" dirty="0">
-                <a:latin typeface="Calibri" panose="020F0502020204030204" pitchFamily="34" charset="0"/>
+              <a:rPr lang="fr-FR" altLang="fr-FR" sz="3200" dirty="0">
                 <a:ea typeface="Calibri" panose="020F0502020204030204" pitchFamily="34" charset="0"/>
                 <a:cs typeface="Times New Roman" panose="02020603050405020304" pitchFamily="18" charset="0"/>
               </a:rPr>
-              <a:t>: </a:t>
-            </a:r>
-            <a:r>
-              <a:rPr lang="fr-FR" altLang="fr-FR" dirty="0">
-                <a:latin typeface="Calibri" panose="020F0502020204030204" pitchFamily="34" charset="0"/>
-                <a:ea typeface="Calibri" panose="020F0502020204030204" pitchFamily="34" charset="0"/>
-                <a:cs typeface="Times New Roman" panose="02020603050405020304" pitchFamily="18" charset="0"/>
-              </a:rPr>
-              <a:t>Louer un bus</a:t>
-            </a:r>
-            <a:endParaRPr lang="fr-FR" dirty="0"/>
+              <a:t>: Satisfaction client</a:t>
+            </a:r>
+            <a:endParaRPr lang="fr-FR" sz="3200" dirty="0"/>
           </a:p>
         </p:txBody>
       </p:sp>
@@ -5713,7 +5705,7 @@
         <p:spPr>
           <a:xfrm>
             <a:off x="1026941" y="1690688"/>
-            <a:ext cx="10522633" cy="1477328"/>
+            <a:ext cx="10522633" cy="2062103"/>
           </a:xfrm>
           <a:prstGeom prst="rect">
             <a:avLst/>
@@ -5731,8 +5723,10 @@
               <a:buChar char="•"/>
             </a:pPr>
             <a:r>
-              <a:rPr lang="fr-FR" dirty="0"/>
-              <a:t>Section entrée des données pour la réservation</a:t>
+              <a:rPr lang="fr-FR" sz="3200" dirty="0">
+                <a:latin typeface="+mj-lt"/>
+              </a:rPr>
+              <a:t>Section témoignages voyageur</a:t>
             </a:r>
           </a:p>
           <a:p>
@@ -5741,8 +5735,10 @@
               <a:buChar char="•"/>
             </a:pPr>
             <a:r>
-              <a:rPr lang="fr-FR" dirty="0"/>
-              <a:t>Section avantage du service de réservation son propre bus </a:t>
+              <a:rPr lang="fr-FR" sz="3200" dirty="0">
+                <a:latin typeface="+mj-lt"/>
+              </a:rPr>
+              <a:t>Section témoignages compagnies</a:t>
             </a:r>
           </a:p>
           <a:p>
@@ -5751,8 +5747,10 @@
               <a:buChar char="•"/>
             </a:pPr>
             <a:r>
-              <a:rPr lang="fr-FR" dirty="0"/>
-              <a:t>Section témoignage des anciens clients</a:t>
+              <a:rPr lang="fr-FR" sz="3200" dirty="0">
+                <a:latin typeface="+mj-lt"/>
+              </a:rPr>
+              <a:t>Section charte et engagement pour la satisfaction client</a:t>
             </a:r>
           </a:p>
           <a:p>
@@ -5761,17 +5759,9 @@
               <a:buChar char="•"/>
             </a:pPr>
             <a:r>
-              <a:rPr lang="fr-FR" dirty="0"/>
-              <a:t>Section comment ça marche </a:t>
-            </a:r>
-          </a:p>
-          <a:p>
-            <a:pPr marL="285750" indent="-285750">
-              <a:buFont typeface="Arial" panose="020B0604020202020204" pitchFamily="34" charset="0"/>
-              <a:buChar char="•"/>
-            </a:pPr>
-            <a:r>
-              <a:rPr lang="fr-FR" dirty="0"/>
+              <a:rPr lang="fr-FR" sz="3200" dirty="0">
+                <a:latin typeface="+mj-lt"/>
+              </a:rPr>
               <a:t>Le pied de page</a:t>
             </a:r>
           </a:p>
@@ -5838,33 +5828,25 @@
           </a:xfrm>
         </p:spPr>
         <p:txBody>
-          <a:bodyPr/>
-          <a:lstStyle/>
-          <a:p>
-            <a:r>
-              <a:rPr lang="fr-FR" altLang="fr-FR" b="1" dirty="0">
-                <a:latin typeface="Calibri" panose="020F0502020204030204" pitchFamily="34" charset="0"/>
+          <a:bodyPr>
+            <a:normAutofit/>
+          </a:bodyPr>
+          <a:lstStyle/>
+          <a:p>
+            <a:r>
+              <a:rPr lang="fr-FR" altLang="fr-FR" sz="3200" dirty="0">
                 <a:cs typeface="Times New Roman" panose="02020603050405020304" pitchFamily="18" charset="0"/>
               </a:rPr>
               <a:t>L’entreprise </a:t>
             </a:r>
             <a:r>
-              <a:rPr lang="fr-FR" altLang="fr-FR" b="1" dirty="0">
-                <a:latin typeface="Calibri" panose="020F0502020204030204" pitchFamily="34" charset="0"/>
+              <a:rPr lang="fr-FR" altLang="fr-FR" sz="3200" dirty="0">
                 <a:ea typeface="Calibri" panose="020F0502020204030204" pitchFamily="34" charset="0"/>
                 <a:cs typeface="Times New Roman" panose="02020603050405020304" pitchFamily="18" charset="0"/>
               </a:rPr>
-              <a:t>: </a:t>
-            </a:r>
-            <a:r>
-              <a:rPr lang="fr-FR" altLang="fr-FR" dirty="0">
-                <a:latin typeface="Calibri" panose="020F0502020204030204" pitchFamily="34" charset="0"/>
-                <a:ea typeface="Calibri" panose="020F0502020204030204" pitchFamily="34" charset="0"/>
-                <a:cs typeface="Times New Roman" panose="02020603050405020304" pitchFamily="18" charset="0"/>
-              </a:rPr>
-              <a:t>Louer un bus</a:t>
-            </a:r>
-            <a:endParaRPr lang="fr-FR" dirty="0"/>
+              <a:t>: Presse</a:t>
+            </a:r>
+            <a:endParaRPr lang="fr-FR" sz="3200" dirty="0"/>
           </a:p>
         </p:txBody>
       </p:sp>
@@ -5883,7 +5865,7 @@
         <p:spPr>
           <a:xfrm>
             <a:off x="1026941" y="1690688"/>
-            <a:ext cx="10522633" cy="1477328"/>
+            <a:ext cx="10522633" cy="2062103"/>
           </a:xfrm>
           <a:prstGeom prst="rect">
             <a:avLst/>
@@ -5901,8 +5883,10 @@
               <a:buChar char="•"/>
             </a:pPr>
             <a:r>
-              <a:rPr lang="fr-FR" dirty="0"/>
-              <a:t>Section entrée des données pour la réservation</a:t>
+              <a:rPr lang="fr-FR" sz="3200" dirty="0">
+                <a:latin typeface="+mj-lt"/>
+              </a:rPr>
+              <a:t>Section présentation lien contact presse avec l’entreprise</a:t>
             </a:r>
           </a:p>
           <a:p>
@@ -5911,8 +5895,10 @@
               <a:buChar char="•"/>
             </a:pPr>
             <a:r>
-              <a:rPr lang="fr-FR" dirty="0"/>
-              <a:t>Section avantage du service de réservation son propre bus </a:t>
+              <a:rPr lang="fr-FR" sz="3200" dirty="0">
+                <a:latin typeface="+mj-lt"/>
+              </a:rPr>
+              <a:t>Article à la une</a:t>
             </a:r>
           </a:p>
           <a:p>
@@ -5921,8 +5907,10 @@
               <a:buChar char="•"/>
             </a:pPr>
             <a:r>
-              <a:rPr lang="fr-FR" dirty="0"/>
-              <a:t>Section témoignage des anciens clients</a:t>
+              <a:rPr lang="fr-FR" sz="3200" dirty="0">
+                <a:latin typeface="+mj-lt"/>
+              </a:rPr>
+              <a:t>Médiathèque</a:t>
             </a:r>
           </a:p>
           <a:p>
@@ -5931,17 +5919,9 @@
               <a:buChar char="•"/>
             </a:pPr>
             <a:r>
-              <a:rPr lang="fr-FR" dirty="0"/>
-              <a:t>Section comment ça marche </a:t>
-            </a:r>
-          </a:p>
-          <a:p>
-            <a:pPr marL="285750" indent="-285750">
-              <a:buFont typeface="Arial" panose="020B0604020202020204" pitchFamily="34" charset="0"/>
-              <a:buChar char="•"/>
-            </a:pPr>
-            <a:r>
-              <a:rPr lang="fr-FR" dirty="0"/>
+              <a:rPr lang="fr-FR" sz="3200" dirty="0">
+                <a:latin typeface="+mj-lt"/>
+              </a:rPr>
               <a:t>Le pied de page</a:t>
             </a:r>
           </a:p>
@@ -6011,33 +5991,18 @@
           </a:xfrm>
         </p:spPr>
         <p:txBody>
-          <a:bodyPr/>
-          <a:lstStyle/>
-          <a:p>
-            <a:r>
-              <a:rPr lang="fr-FR" altLang="fr-FR" b="1" dirty="0">
-                <a:latin typeface="Calibri" panose="020F0502020204030204" pitchFamily="34" charset="0"/>
+          <a:bodyPr>
+            <a:normAutofit/>
+          </a:bodyPr>
+          <a:lstStyle/>
+          <a:p>
+            <a:r>
+              <a:rPr lang="fr-FR" altLang="fr-FR" sz="3200" dirty="0">
                 <a:cs typeface="Times New Roman" panose="02020603050405020304" pitchFamily="18" charset="0"/>
               </a:rPr>
-              <a:t>Aide &amp; FAQ </a:t>
-            </a:r>
-            <a:r>
-              <a:rPr lang="fr-FR" altLang="fr-FR" b="1" dirty="0">
-                <a:latin typeface="Calibri" panose="020F0502020204030204" pitchFamily="34" charset="0"/>
-                <a:ea typeface="Calibri" panose="020F0502020204030204" pitchFamily="34" charset="0"/>
-                <a:cs typeface="Times New Roman" panose="02020603050405020304" pitchFamily="18" charset="0"/>
-              </a:rPr>
-              <a:t>: </a:t>
-            </a:r>
-            <a:r>
-              <a:rPr lang="fr-FR" altLang="fr-FR" dirty="0">
-                <a:latin typeface="Calibri" panose="020F0502020204030204" pitchFamily="34" charset="0"/>
-                <a:ea typeface="Calibri" panose="020F0502020204030204" pitchFamily="34" charset="0"/>
-                <a:cs typeface="Times New Roman" panose="02020603050405020304" pitchFamily="18" charset="0"/>
-              </a:rPr>
-              <a:t>Louer un bus</a:t>
-            </a:r>
-            <a:endParaRPr lang="fr-FR" dirty="0"/>
+              <a:t>Aide &amp; FAQ</a:t>
+            </a:r>
+            <a:endParaRPr lang="fr-FR" sz="3200" dirty="0"/>
           </a:p>
         </p:txBody>
       </p:sp>
@@ -6056,7 +6021,7 @@
         <p:spPr>
           <a:xfrm>
             <a:off x="1026941" y="1690688"/>
-            <a:ext cx="10522633" cy="1477328"/>
+            <a:ext cx="10522633" cy="2554545"/>
           </a:xfrm>
           <a:prstGeom prst="rect">
             <a:avLst/>
@@ -6074,8 +6039,10 @@
               <a:buChar char="•"/>
             </a:pPr>
             <a:r>
-              <a:rPr lang="fr-FR" dirty="0"/>
-              <a:t>Section entrée des données pour la réservation</a:t>
+              <a:rPr lang="fr-FR" sz="3200" dirty="0">
+                <a:latin typeface="+mj-lt"/>
+              </a:rPr>
+              <a:t>Section aide concernant réservations</a:t>
             </a:r>
           </a:p>
           <a:p>
@@ -6084,8 +6051,10 @@
               <a:buChar char="•"/>
             </a:pPr>
             <a:r>
-              <a:rPr lang="fr-FR" dirty="0"/>
-              <a:t>Section avantage du service de réservation son propre bus </a:t>
+              <a:rPr lang="fr-FR" sz="3200" dirty="0">
+                <a:latin typeface="+mj-lt"/>
+              </a:rPr>
+              <a:t>Section aide concernant les payements</a:t>
             </a:r>
           </a:p>
           <a:p>
@@ -6094,8 +6063,10 @@
               <a:buChar char="•"/>
             </a:pPr>
             <a:r>
-              <a:rPr lang="fr-FR" dirty="0"/>
-              <a:t>Section témoignage des anciens clients</a:t>
+              <a:rPr lang="fr-FR" sz="3200" dirty="0">
+                <a:latin typeface="+mj-lt"/>
+              </a:rPr>
+              <a:t>Section aide concernant le voyages : sièges, arrêts, imprévus</a:t>
             </a:r>
           </a:p>
           <a:p>
@@ -6104,8 +6075,10 @@
               <a:buChar char="•"/>
             </a:pPr>
             <a:r>
-              <a:rPr lang="fr-FR" dirty="0"/>
-              <a:t>Section comment ça marche </a:t>
+              <a:rPr lang="fr-FR" sz="3200" dirty="0">
+                <a:latin typeface="+mj-lt"/>
+              </a:rPr>
+              <a:t>Devenir partenaires</a:t>
             </a:r>
           </a:p>
           <a:p>
@@ -6114,7 +6087,9 @@
               <a:buChar char="•"/>
             </a:pPr>
             <a:r>
-              <a:rPr lang="fr-FR" dirty="0"/>
+              <a:rPr lang="fr-FR" sz="3200" dirty="0">
+                <a:latin typeface="+mj-lt"/>
+              </a:rPr>
               <a:t>Le pied de page</a:t>
             </a:r>
           </a:p>
@@ -6181,33 +6156,18 @@
           </a:xfrm>
         </p:spPr>
         <p:txBody>
-          <a:bodyPr/>
-          <a:lstStyle/>
-          <a:p>
-            <a:r>
-              <a:rPr lang="fr-FR" altLang="fr-FR" b="1" dirty="0">
-                <a:latin typeface="Calibri" panose="020F0502020204030204" pitchFamily="34" charset="0"/>
+          <a:bodyPr>
+            <a:normAutofit/>
+          </a:bodyPr>
+          <a:lstStyle/>
+          <a:p>
+            <a:r>
+              <a:rPr lang="fr-FR" altLang="fr-FR" sz="3200">
                 <a:cs typeface="Times New Roman" panose="02020603050405020304" pitchFamily="18" charset="0"/>
               </a:rPr>
-              <a:t>LOG-IN </a:t>
-            </a:r>
-            <a:r>
-              <a:rPr lang="fr-FR" altLang="fr-FR" b="1" dirty="0">
-                <a:latin typeface="Calibri" panose="020F0502020204030204" pitchFamily="34" charset="0"/>
-                <a:ea typeface="Calibri" panose="020F0502020204030204" pitchFamily="34" charset="0"/>
-                <a:cs typeface="Times New Roman" panose="02020603050405020304" pitchFamily="18" charset="0"/>
-              </a:rPr>
-              <a:t>: </a:t>
-            </a:r>
-            <a:r>
-              <a:rPr lang="fr-FR" altLang="fr-FR" dirty="0">
-                <a:latin typeface="Calibri" panose="020F0502020204030204" pitchFamily="34" charset="0"/>
-                <a:ea typeface="Calibri" panose="020F0502020204030204" pitchFamily="34" charset="0"/>
-                <a:cs typeface="Times New Roman" panose="02020603050405020304" pitchFamily="18" charset="0"/>
-              </a:rPr>
-              <a:t>Louer un bus</a:t>
-            </a:r>
-            <a:endParaRPr lang="fr-FR" dirty="0"/>
+              <a:t>LOG-IN</a:t>
+            </a:r>
+            <a:endParaRPr lang="fr-FR" sz="3200" dirty="0"/>
           </a:p>
         </p:txBody>
       </p:sp>
@@ -6226,7 +6186,7 @@
         <p:spPr>
           <a:xfrm>
             <a:off x="1026941" y="1690688"/>
-            <a:ext cx="10522633" cy="1477328"/>
+            <a:ext cx="10522633" cy="1569660"/>
           </a:xfrm>
           <a:prstGeom prst="rect">
             <a:avLst/>
@@ -6244,8 +6204,10 @@
               <a:buChar char="•"/>
             </a:pPr>
             <a:r>
-              <a:rPr lang="fr-FR" dirty="0"/>
-              <a:t>Section entrée des données pour la réservation</a:t>
+              <a:rPr lang="fr-FR" sz="3200" dirty="0">
+                <a:latin typeface="+mj-lt"/>
+              </a:rPr>
+              <a:t>Façade connexion / inscription pour clients et agences démarchages</a:t>
             </a:r>
           </a:p>
           <a:p>
@@ -6254,37 +6216,9 @@
               <a:buChar char="•"/>
             </a:pPr>
             <a:r>
-              <a:rPr lang="fr-FR" dirty="0"/>
-              <a:t>Section avantage du service de réservation son propre bus </a:t>
-            </a:r>
-          </a:p>
-          <a:p>
-            <a:pPr marL="285750" indent="-285750">
-              <a:buFont typeface="Arial" panose="020B0604020202020204" pitchFamily="34" charset="0"/>
-              <a:buChar char="•"/>
-            </a:pPr>
-            <a:r>
-              <a:rPr lang="fr-FR" dirty="0"/>
-              <a:t>Section témoignage des anciens clients</a:t>
-            </a:r>
-          </a:p>
-          <a:p>
-            <a:pPr marL="285750" indent="-285750">
-              <a:buFont typeface="Arial" panose="020B0604020202020204" pitchFamily="34" charset="0"/>
-              <a:buChar char="•"/>
-            </a:pPr>
-            <a:r>
-              <a:rPr lang="fr-FR" dirty="0"/>
-              <a:t>Section comment ça marche </a:t>
-            </a:r>
-          </a:p>
-          <a:p>
-            <a:pPr marL="285750" indent="-285750">
-              <a:buFont typeface="Arial" panose="020B0604020202020204" pitchFamily="34" charset="0"/>
-              <a:buChar char="•"/>
-            </a:pPr>
-            <a:r>
-              <a:rPr lang="fr-FR" dirty="0"/>
+              <a:rPr lang="fr-FR" sz="3200" dirty="0">
+                <a:latin typeface="+mj-lt"/>
+              </a:rPr>
               <a:t>Le pied de page</a:t>
             </a:r>
           </a:p>
@@ -6348,11 +6282,13 @@
         </p:nvSpPr>
         <p:spPr/>
         <p:txBody>
-          <a:bodyPr/>
-          <a:lstStyle/>
-          <a:p>
-            <a:r>
-              <a:rPr lang="fr-FR" dirty="0"/>
+          <a:bodyPr>
+            <a:normAutofit/>
+          </a:bodyPr>
+          <a:lstStyle/>
+          <a:p>
+            <a:r>
+              <a:rPr lang="fr-FR" sz="3200" dirty="0"/>
               <a:t>Accueil</a:t>
             </a:r>
           </a:p>
@@ -6373,7 +6309,7 @@
         <p:spPr>
           <a:xfrm>
             <a:off x="1026942" y="1690688"/>
-            <a:ext cx="9411286" cy="1477328"/>
+            <a:ext cx="9411286" cy="2554545"/>
           </a:xfrm>
           <a:prstGeom prst="rect">
             <a:avLst/>
@@ -6391,7 +6327,9 @@
               <a:buChar char="•"/>
             </a:pPr>
             <a:r>
-              <a:rPr lang="fr-FR" dirty="0"/>
+              <a:rPr lang="fr-FR" sz="3200" dirty="0">
+                <a:latin typeface="+mj-lt"/>
+              </a:rPr>
               <a:t>Barre de menu</a:t>
             </a:r>
           </a:p>
@@ -6401,7 +6339,9 @@
               <a:buChar char="•"/>
             </a:pPr>
             <a:r>
-              <a:rPr lang="fr-FR" dirty="0"/>
+              <a:rPr lang="fr-FR" sz="3200" dirty="0">
+                <a:latin typeface="+mj-lt"/>
+              </a:rPr>
               <a:t>Section recherche de bus</a:t>
             </a:r>
           </a:p>
@@ -6411,8 +6351,10 @@
               <a:buChar char="•"/>
             </a:pPr>
             <a:r>
-              <a:rPr lang="fr-FR" dirty="0"/>
-              <a:t>Section bonus et promotion actuels</a:t>
+              <a:rPr lang="fr-FR" sz="3200" dirty="0">
+                <a:latin typeface="+mj-lt"/>
+              </a:rPr>
+              <a:t>Section bonus et promotions actuels</a:t>
             </a:r>
           </a:p>
           <a:p>
@@ -6421,7 +6363,9 @@
               <a:buChar char="•"/>
             </a:pPr>
             <a:r>
-              <a:rPr lang="fr-FR" dirty="0"/>
+              <a:rPr lang="fr-FR" sz="3200" dirty="0">
+                <a:latin typeface="+mj-lt"/>
+              </a:rPr>
               <a:t>Section comment ça marche</a:t>
             </a:r>
           </a:p>
@@ -6431,7 +6375,9 @@
               <a:buChar char="•"/>
             </a:pPr>
             <a:r>
-              <a:rPr lang="fr-FR" dirty="0"/>
+              <a:rPr lang="fr-FR" sz="3200" dirty="0">
+                <a:latin typeface="+mj-lt"/>
+              </a:rPr>
               <a:t>Pied de page</a:t>
             </a:r>
           </a:p>
@@ -6497,14 +6443,10 @@
           <a:lstStyle/>
           <a:p>
             <a:r>
-              <a:rPr lang="fr-FR" altLang="fr-FR" b="1" dirty="0">
-                <a:latin typeface="Calibri" panose="020F0502020204030204" pitchFamily="34" charset="0"/>
-                <a:ea typeface="Calibri" panose="020F0502020204030204" pitchFamily="34" charset="0"/>
-                <a:cs typeface="Times New Roman" panose="02020603050405020304" pitchFamily="18" charset="0"/>
-              </a:rPr>
+              <a:rPr lang="fr-FR" altLang="fr-FR" sz="3200" dirty="0"/>
               <a:t>Organiser votre voyage : Réserver</a:t>
             </a:r>
-            <a:endParaRPr lang="fr-FR" dirty="0"/>
+            <a:endParaRPr lang="fr-FR" sz="3200" dirty="0"/>
           </a:p>
         </p:txBody>
       </p:sp>
@@ -6523,7 +6465,7 @@
         <p:spPr>
           <a:xfrm>
             <a:off x="1026942" y="1690688"/>
-            <a:ext cx="9411286" cy="923330"/>
+            <a:ext cx="9411286" cy="1421928"/>
           </a:xfrm>
           <a:prstGeom prst="rect">
             <a:avLst/>
@@ -6536,32 +6478,62 @@
           </a:bodyPr>
           <a:lstStyle/>
           <a:p>
-            <a:pPr marL="285750" indent="-285750">
+            <a:pPr marL="457200" indent="-457200">
+              <a:lnSpc>
+                <a:spcPct val="90000"/>
+              </a:lnSpc>
+              <a:spcBef>
+                <a:spcPct val="0"/>
+              </a:spcBef>
               <a:buFont typeface="Arial" panose="020B0604020202020204" pitchFamily="34" charset="0"/>
               <a:buChar char="•"/>
             </a:pPr>
             <a:r>
-              <a:rPr lang="fr-FR" dirty="0"/>
+              <a:rPr lang="fr-FR" sz="3200" dirty="0">
+                <a:latin typeface="+mj-lt"/>
+                <a:ea typeface="+mj-ea"/>
+                <a:cs typeface="+mj-cs"/>
+              </a:rPr>
               <a:t>Section recherche de bus</a:t>
             </a:r>
           </a:p>
           <a:p>
-            <a:pPr marL="285750" indent="-285750">
+            <a:pPr marL="457200" indent="-457200">
+              <a:lnSpc>
+                <a:spcPct val="90000"/>
+              </a:lnSpc>
+              <a:spcBef>
+                <a:spcPct val="0"/>
+              </a:spcBef>
               <a:buFont typeface="Arial" panose="020B0604020202020204" pitchFamily="34" charset="0"/>
               <a:buChar char="•"/>
             </a:pPr>
             <a:r>
-              <a:rPr lang="fr-FR" dirty="0"/>
+              <a:rPr lang="fr-FR" sz="3200" dirty="0">
+                <a:latin typeface="+mj-lt"/>
+                <a:ea typeface="+mj-ea"/>
+                <a:cs typeface="+mj-cs"/>
+              </a:rPr>
               <a:t>Section comment ça marche</a:t>
             </a:r>
           </a:p>
           <a:p>
-            <a:pPr marL="285750" indent="-285750">
+            <a:pPr marL="457200" indent="-457200">
+              <a:lnSpc>
+                <a:spcPct val="90000"/>
+              </a:lnSpc>
+              <a:spcBef>
+                <a:spcPct val="0"/>
+              </a:spcBef>
               <a:buFont typeface="Arial" panose="020B0604020202020204" pitchFamily="34" charset="0"/>
               <a:buChar char="•"/>
             </a:pPr>
             <a:r>
-              <a:rPr lang="fr-FR" dirty="0"/>
+              <a:rPr lang="fr-FR" sz="3200" dirty="0">
+                <a:latin typeface="+mj-lt"/>
+                <a:ea typeface="+mj-ea"/>
+                <a:cs typeface="+mj-cs"/>
+              </a:rPr>
               <a:t>Pied de page</a:t>
             </a:r>
           </a:p>
@@ -6628,18 +6600,19 @@
           </a:xfrm>
         </p:spPr>
         <p:txBody>
-          <a:bodyPr/>
-          <a:lstStyle/>
-          <a:p>
-            <a:r>
-              <a:rPr lang="fr-FR" altLang="fr-FR" b="1" dirty="0">
-                <a:latin typeface="Calibri" panose="020F0502020204030204" pitchFamily="34" charset="0"/>
+          <a:bodyPr>
+            <a:normAutofit/>
+          </a:bodyPr>
+          <a:lstStyle/>
+          <a:p>
+            <a:r>
+              <a:rPr lang="fr-FR" altLang="fr-FR" sz="3200" dirty="0">
                 <a:ea typeface="Calibri" panose="020F0502020204030204" pitchFamily="34" charset="0"/>
                 <a:cs typeface="Times New Roman" panose="02020603050405020304" pitchFamily="18" charset="0"/>
               </a:rPr>
               <a:t>Organiser votre voyage : Découvrir destinations</a:t>
             </a:r>
-            <a:endParaRPr lang="fr-FR" dirty="0"/>
+            <a:endParaRPr lang="fr-FR" sz="3200" dirty="0"/>
           </a:p>
         </p:txBody>
       </p:sp>
@@ -6658,7 +6631,7 @@
         <p:spPr>
           <a:xfrm>
             <a:off x="1026941" y="1690688"/>
-            <a:ext cx="10522633" cy="923330"/>
+            <a:ext cx="10522633" cy="2062103"/>
           </a:xfrm>
           <a:prstGeom prst="rect">
             <a:avLst/>
@@ -6676,7 +6649,9 @@
               <a:buChar char="•"/>
             </a:pPr>
             <a:r>
-              <a:rPr lang="fr-FR" dirty="0"/>
+              <a:rPr lang="fr-FR" sz="3200" dirty="0">
+                <a:latin typeface="+mj-lt"/>
+              </a:rPr>
               <a:t>Section présentation rapide des destinations principales : Abidjan, Bouaké, Yamoussoukro, Daloa…</a:t>
             </a:r>
           </a:p>
@@ -6686,7 +6661,9 @@
               <a:buChar char="•"/>
             </a:pPr>
             <a:r>
-              <a:rPr lang="fr-FR" dirty="0"/>
+              <a:rPr lang="fr-FR" sz="3200" dirty="0">
+                <a:latin typeface="+mj-lt"/>
+              </a:rPr>
               <a:t>Section recherches destinations possibles </a:t>
             </a:r>
           </a:p>
@@ -6696,8 +6673,10 @@
               <a:buChar char="•"/>
             </a:pPr>
             <a:r>
-              <a:rPr lang="fr-FR" dirty="0"/>
-              <a:t>Le pied de page</a:t>
+              <a:rPr lang="fr-FR" sz="3200" dirty="0">
+                <a:latin typeface="+mj-lt"/>
+              </a:rPr>
+              <a:t>Pied de page</a:t>
             </a:r>
           </a:p>
         </p:txBody>
@@ -6763,18 +6742,19 @@
           </a:xfrm>
         </p:spPr>
         <p:txBody>
-          <a:bodyPr/>
-          <a:lstStyle/>
-          <a:p>
-            <a:r>
-              <a:rPr lang="fr-FR" altLang="fr-FR" b="1" dirty="0">
-                <a:latin typeface="Calibri" panose="020F0502020204030204" pitchFamily="34" charset="0"/>
+          <a:bodyPr>
+            <a:normAutofit/>
+          </a:bodyPr>
+          <a:lstStyle/>
+          <a:p>
+            <a:r>
+              <a:rPr lang="fr-FR" altLang="fr-FR" sz="3200" dirty="0">
                 <a:ea typeface="Calibri" panose="020F0502020204030204" pitchFamily="34" charset="0"/>
                 <a:cs typeface="Times New Roman" panose="02020603050405020304" pitchFamily="18" charset="0"/>
               </a:rPr>
               <a:t>Organiser votre voyage : Compagnies et gares</a:t>
             </a:r>
-            <a:endParaRPr lang="fr-FR" dirty="0"/>
+            <a:endParaRPr lang="fr-FR" sz="3200" dirty="0"/>
           </a:p>
         </p:txBody>
       </p:sp>
@@ -6793,7 +6773,7 @@
         <p:spPr>
           <a:xfrm>
             <a:off x="1026941" y="1690688"/>
-            <a:ext cx="10522633" cy="1200329"/>
+            <a:ext cx="10522633" cy="2554545"/>
           </a:xfrm>
           <a:prstGeom prst="rect">
             <a:avLst/>
@@ -6811,16 +6791,10 @@
               <a:buChar char="•"/>
             </a:pPr>
             <a:r>
-              <a:rPr lang="fr-FR" dirty="0"/>
-              <a:t>Section présentation rapide des principales compagnies : UTB, UTS, STIF, </a:t>
-            </a:r>
-            <a:r>
-              <a:rPr lang="fr-FR" dirty="0" err="1"/>
-              <a:t>Leopard</a:t>
-            </a:r>
-            <a:r>
-              <a:rPr lang="fr-FR" dirty="0"/>
-              <a:t>…</a:t>
+              <a:rPr lang="fr-FR" sz="3200" dirty="0">
+                <a:latin typeface="+mj-lt"/>
+              </a:rPr>
+              <a:t>Section présentation rapide des principales compagnies : UTB, UTS, STIF, Léopard…</a:t>
             </a:r>
           </a:p>
           <a:p>
@@ -6829,7 +6803,9 @@
               <a:buChar char="•"/>
             </a:pPr>
             <a:r>
-              <a:rPr lang="fr-FR" dirty="0"/>
+              <a:rPr lang="fr-FR" sz="3200" dirty="0">
+                <a:latin typeface="+mj-lt"/>
+              </a:rPr>
               <a:t>Section bar de recherche de compagnies</a:t>
             </a:r>
           </a:p>
@@ -6839,7 +6815,9 @@
               <a:buChar char="•"/>
             </a:pPr>
             <a:r>
-              <a:rPr lang="fr-FR" dirty="0"/>
+              <a:rPr lang="fr-FR" sz="3200" dirty="0">
+                <a:latin typeface="+mj-lt"/>
+              </a:rPr>
               <a:t>Section recherche ville  + gare dispo dans chaque ville</a:t>
             </a:r>
           </a:p>
@@ -6849,8 +6827,10 @@
               <a:buChar char="•"/>
             </a:pPr>
             <a:r>
-              <a:rPr lang="fr-FR" dirty="0"/>
-              <a:t>Le pied de page</a:t>
+              <a:rPr lang="fr-FR" sz="3200" dirty="0">
+                <a:latin typeface="+mj-lt"/>
+              </a:rPr>
+              <a:t>Pied de page</a:t>
             </a:r>
           </a:p>
         </p:txBody>
@@ -6916,33 +6896,25 @@
           </a:xfrm>
         </p:spPr>
         <p:txBody>
-          <a:bodyPr/>
-          <a:lstStyle/>
-          <a:p>
-            <a:r>
-              <a:rPr lang="fr-FR" altLang="fr-FR" b="1" dirty="0">
-                <a:latin typeface="Calibri" panose="020F0502020204030204" pitchFamily="34" charset="0"/>
+          <a:bodyPr>
+            <a:normAutofit/>
+          </a:bodyPr>
+          <a:lstStyle/>
+          <a:p>
+            <a:r>
+              <a:rPr lang="fr-FR" altLang="fr-FR" sz="3200" dirty="0">
                 <a:cs typeface="Times New Roman" panose="02020603050405020304" pitchFamily="18" charset="0"/>
               </a:rPr>
               <a:t>Services izyGO </a:t>
             </a:r>
             <a:r>
-              <a:rPr lang="fr-FR" altLang="fr-FR" b="1" dirty="0">
-                <a:latin typeface="Calibri" panose="020F0502020204030204" pitchFamily="34" charset="0"/>
+              <a:rPr lang="fr-FR" altLang="fr-FR" sz="3200" dirty="0">
                 <a:ea typeface="Calibri" panose="020F0502020204030204" pitchFamily="34" charset="0"/>
                 <a:cs typeface="Times New Roman" panose="02020603050405020304" pitchFamily="18" charset="0"/>
               </a:rPr>
-              <a:t>: </a:t>
-            </a:r>
-            <a:r>
-              <a:rPr lang="fr-FR" altLang="fr-FR" dirty="0">
-                <a:latin typeface="Calibri" panose="020F0502020204030204" pitchFamily="34" charset="0"/>
-                <a:ea typeface="Calibri" panose="020F0502020204030204" pitchFamily="34" charset="0"/>
-                <a:cs typeface="Times New Roman" panose="02020603050405020304" pitchFamily="18" charset="0"/>
-              </a:rPr>
-              <a:t>Gérer ma réservation</a:t>
-            </a:r>
-            <a:endParaRPr lang="fr-FR" dirty="0"/>
+              <a:t>: Gérer ma réservation</a:t>
+            </a:r>
+            <a:endParaRPr lang="fr-FR" sz="3200" dirty="0"/>
           </a:p>
         </p:txBody>
       </p:sp>
@@ -6961,7 +6933,7 @@
         <p:spPr>
           <a:xfrm>
             <a:off x="1026941" y="1690688"/>
-            <a:ext cx="10522633" cy="923330"/>
+            <a:ext cx="10522633" cy="1569660"/>
           </a:xfrm>
           <a:prstGeom prst="rect">
             <a:avLst/>
@@ -6979,7 +6951,9 @@
               <a:buChar char="•"/>
             </a:pPr>
             <a:r>
-              <a:rPr lang="fr-FR" dirty="0"/>
+              <a:rPr lang="fr-FR" sz="3200" dirty="0">
+                <a:latin typeface="+mj-lt"/>
+              </a:rPr>
               <a:t>Section modification de la réservation avec les conditions</a:t>
             </a:r>
           </a:p>
@@ -6989,7 +6963,9 @@
               <a:buChar char="•"/>
             </a:pPr>
             <a:r>
-              <a:rPr lang="fr-FR" dirty="0"/>
+              <a:rPr lang="fr-FR" sz="3200" dirty="0">
+                <a:latin typeface="+mj-lt"/>
+              </a:rPr>
               <a:t>Section Annulation de la réservation avec les conditions</a:t>
             </a:r>
           </a:p>
@@ -6999,8 +6975,10 @@
               <a:buChar char="•"/>
             </a:pPr>
             <a:r>
-              <a:rPr lang="fr-FR" dirty="0"/>
-              <a:t>Le pied de page</a:t>
+              <a:rPr lang="fr-FR" sz="3200" dirty="0">
+                <a:latin typeface="+mj-lt"/>
+              </a:rPr>
+              <a:t>Pied de page</a:t>
             </a:r>
           </a:p>
         </p:txBody>
@@ -7066,33 +7044,25 @@
           </a:xfrm>
         </p:spPr>
         <p:txBody>
-          <a:bodyPr/>
-          <a:lstStyle/>
-          <a:p>
-            <a:r>
-              <a:rPr lang="fr-FR" altLang="fr-FR" b="1" dirty="0">
-                <a:latin typeface="Calibri" panose="020F0502020204030204" pitchFamily="34" charset="0"/>
+          <a:bodyPr>
+            <a:normAutofit/>
+          </a:bodyPr>
+          <a:lstStyle/>
+          <a:p>
+            <a:r>
+              <a:rPr lang="fr-FR" altLang="fr-FR" sz="3200" dirty="0">
                 <a:cs typeface="Times New Roman" panose="02020603050405020304" pitchFamily="18" charset="0"/>
               </a:rPr>
               <a:t>Services izyGO </a:t>
             </a:r>
             <a:r>
-              <a:rPr lang="fr-FR" altLang="fr-FR" b="1" dirty="0">
-                <a:latin typeface="Calibri" panose="020F0502020204030204" pitchFamily="34" charset="0"/>
+              <a:rPr lang="fr-FR" altLang="fr-FR" sz="3200" dirty="0">
                 <a:ea typeface="Calibri" panose="020F0502020204030204" pitchFamily="34" charset="0"/>
                 <a:cs typeface="Times New Roman" panose="02020603050405020304" pitchFamily="18" charset="0"/>
               </a:rPr>
-              <a:t>: </a:t>
-            </a:r>
-            <a:r>
-              <a:rPr lang="fr-FR" altLang="fr-FR" dirty="0">
-                <a:latin typeface="Calibri" panose="020F0502020204030204" pitchFamily="34" charset="0"/>
-                <a:ea typeface="Calibri" panose="020F0502020204030204" pitchFamily="34" charset="0"/>
-                <a:cs typeface="Times New Roman" panose="02020603050405020304" pitchFamily="18" charset="0"/>
-              </a:rPr>
-              <a:t>Points de ventes</a:t>
-            </a:r>
-            <a:endParaRPr lang="fr-FR" dirty="0"/>
+              <a:t>: Points de ventes</a:t>
+            </a:r>
+            <a:endParaRPr lang="fr-FR" sz="3200" dirty="0"/>
           </a:p>
         </p:txBody>
       </p:sp>
@@ -7111,7 +7081,7 @@
         <p:spPr>
           <a:xfrm>
             <a:off x="1026941" y="1690688"/>
-            <a:ext cx="10522633" cy="923330"/>
+            <a:ext cx="10522633" cy="1569660"/>
           </a:xfrm>
           <a:prstGeom prst="rect">
             <a:avLst/>
@@ -7129,7 +7099,9 @@
               <a:buChar char="•"/>
             </a:pPr>
             <a:r>
-              <a:rPr lang="fr-FR" dirty="0"/>
+              <a:rPr lang="fr-FR" sz="3200" dirty="0">
+                <a:latin typeface="+mj-lt"/>
+              </a:rPr>
               <a:t>Section présentation rapide des principaux points de ventes</a:t>
             </a:r>
           </a:p>
@@ -7139,7 +7111,9 @@
               <a:buChar char="•"/>
             </a:pPr>
             <a:r>
-              <a:rPr lang="fr-FR" dirty="0"/>
+              <a:rPr lang="fr-FR" sz="3200" dirty="0">
+                <a:latin typeface="+mj-lt"/>
+              </a:rPr>
               <a:t>Section recherche de points de ventes avec slider maps</a:t>
             </a:r>
           </a:p>
@@ -7149,7 +7123,9 @@
               <a:buChar char="•"/>
             </a:pPr>
             <a:r>
-              <a:rPr lang="fr-FR" dirty="0"/>
+              <a:rPr lang="fr-FR" sz="3200" dirty="0">
+                <a:latin typeface="+mj-lt"/>
+              </a:rPr>
               <a:t>Le pied de page</a:t>
             </a:r>
           </a:p>
@@ -7216,33 +7192,25 @@
           </a:xfrm>
         </p:spPr>
         <p:txBody>
-          <a:bodyPr/>
-          <a:lstStyle/>
-          <a:p>
-            <a:r>
-              <a:rPr lang="fr-FR" altLang="fr-FR" b="1" dirty="0">
-                <a:latin typeface="Calibri" panose="020F0502020204030204" pitchFamily="34" charset="0"/>
+          <a:bodyPr>
+            <a:normAutofit/>
+          </a:bodyPr>
+          <a:lstStyle/>
+          <a:p>
+            <a:r>
+              <a:rPr lang="fr-FR" altLang="fr-FR" sz="3200" dirty="0">
                 <a:cs typeface="Times New Roman" panose="02020603050405020304" pitchFamily="18" charset="0"/>
               </a:rPr>
               <a:t>Services izyGO </a:t>
             </a:r>
             <a:r>
-              <a:rPr lang="fr-FR" altLang="fr-FR" b="1" dirty="0">
-                <a:latin typeface="Calibri" panose="020F0502020204030204" pitchFamily="34" charset="0"/>
+              <a:rPr lang="fr-FR" altLang="fr-FR" sz="3200" dirty="0">
                 <a:ea typeface="Calibri" panose="020F0502020204030204" pitchFamily="34" charset="0"/>
                 <a:cs typeface="Times New Roman" panose="02020603050405020304" pitchFamily="18" charset="0"/>
               </a:rPr>
-              <a:t>: </a:t>
-            </a:r>
-            <a:r>
-              <a:rPr lang="fr-FR" altLang="fr-FR" dirty="0">
-                <a:latin typeface="Calibri" panose="020F0502020204030204" pitchFamily="34" charset="0"/>
-                <a:ea typeface="Calibri" panose="020F0502020204030204" pitchFamily="34" charset="0"/>
-                <a:cs typeface="Times New Roman" panose="02020603050405020304" pitchFamily="18" charset="0"/>
-              </a:rPr>
-              <a:t>Louer un bus</a:t>
-            </a:r>
-            <a:endParaRPr lang="fr-FR" dirty="0"/>
+              <a:t>: Louer un bus</a:t>
+            </a:r>
+            <a:endParaRPr lang="fr-FR" sz="3200" dirty="0"/>
           </a:p>
         </p:txBody>
       </p:sp>
@@ -7261,7 +7229,7 @@
         <p:spPr>
           <a:xfrm>
             <a:off x="1026941" y="1690688"/>
-            <a:ext cx="10522633" cy="1477328"/>
+            <a:ext cx="10522633" cy="2554545"/>
           </a:xfrm>
           <a:prstGeom prst="rect">
             <a:avLst/>
@@ -7279,7 +7247,9 @@
               <a:buChar char="•"/>
             </a:pPr>
             <a:r>
-              <a:rPr lang="fr-FR" dirty="0"/>
+              <a:rPr lang="fr-FR" sz="3200" dirty="0">
+                <a:latin typeface="+mj-lt"/>
+              </a:rPr>
               <a:t>Section entrée des données pour la réservation</a:t>
             </a:r>
           </a:p>
@@ -7289,8 +7259,10 @@
               <a:buChar char="•"/>
             </a:pPr>
             <a:r>
-              <a:rPr lang="fr-FR" dirty="0"/>
-              <a:t>Section avantage du service de réservation son propre bus </a:t>
+              <a:rPr lang="fr-FR" sz="3200" dirty="0">
+                <a:latin typeface="+mj-lt"/>
+              </a:rPr>
+              <a:t>Section avantage du service de réservation de son propre bus </a:t>
             </a:r>
           </a:p>
           <a:p>
@@ -7299,7 +7271,9 @@
               <a:buChar char="•"/>
             </a:pPr>
             <a:r>
-              <a:rPr lang="fr-FR" dirty="0"/>
+              <a:rPr lang="fr-FR" sz="3200" dirty="0">
+                <a:latin typeface="+mj-lt"/>
+              </a:rPr>
               <a:t>Section témoignage des anciens clients</a:t>
             </a:r>
           </a:p>
@@ -7309,7 +7283,9 @@
               <a:buChar char="•"/>
             </a:pPr>
             <a:r>
-              <a:rPr lang="fr-FR" dirty="0"/>
+              <a:rPr lang="fr-FR" sz="3200" dirty="0">
+                <a:latin typeface="+mj-lt"/>
+              </a:rPr>
               <a:t>Section comment ça marche </a:t>
             </a:r>
           </a:p>
@@ -7319,7 +7295,9 @@
               <a:buChar char="•"/>
             </a:pPr>
             <a:r>
-              <a:rPr lang="fr-FR" dirty="0"/>
+              <a:rPr lang="fr-FR" sz="3200" dirty="0">
+                <a:latin typeface="+mj-lt"/>
+              </a:rPr>
               <a:t>Le pied de page</a:t>
             </a:r>
           </a:p>
@@ -7386,33 +7364,25 @@
           </a:xfrm>
         </p:spPr>
         <p:txBody>
-          <a:bodyPr/>
-          <a:lstStyle/>
-          <a:p>
-            <a:r>
-              <a:rPr lang="fr-FR" altLang="fr-FR" b="1" dirty="0">
-                <a:latin typeface="Calibri" panose="020F0502020204030204" pitchFamily="34" charset="0"/>
+          <a:bodyPr>
+            <a:normAutofit/>
+          </a:bodyPr>
+          <a:lstStyle/>
+          <a:p>
+            <a:r>
+              <a:rPr lang="fr-FR" altLang="fr-FR" sz="3200" dirty="0">
                 <a:cs typeface="Times New Roman" panose="02020603050405020304" pitchFamily="18" charset="0"/>
               </a:rPr>
               <a:t>L’entreprise </a:t>
             </a:r>
             <a:r>
-              <a:rPr lang="fr-FR" altLang="fr-FR" b="1" dirty="0">
-                <a:latin typeface="Calibri" panose="020F0502020204030204" pitchFamily="34" charset="0"/>
+              <a:rPr lang="fr-FR" altLang="fr-FR" sz="3200" dirty="0">
                 <a:ea typeface="Calibri" panose="020F0502020204030204" pitchFamily="34" charset="0"/>
                 <a:cs typeface="Times New Roman" panose="02020603050405020304" pitchFamily="18" charset="0"/>
               </a:rPr>
-              <a:t>: </a:t>
-            </a:r>
-            <a:r>
-              <a:rPr lang="fr-FR" altLang="fr-FR" dirty="0">
-                <a:latin typeface="Calibri" panose="020F0502020204030204" pitchFamily="34" charset="0"/>
-                <a:ea typeface="Calibri" panose="020F0502020204030204" pitchFamily="34" charset="0"/>
-                <a:cs typeface="Times New Roman" panose="02020603050405020304" pitchFamily="18" charset="0"/>
-              </a:rPr>
-              <a:t>Louer un bus</a:t>
-            </a:r>
-            <a:endParaRPr lang="fr-FR" dirty="0"/>
+              <a:t>: A propos</a:t>
+            </a:r>
+            <a:endParaRPr lang="fr-FR" sz="3200" dirty="0"/>
           </a:p>
         </p:txBody>
       </p:sp>
@@ -7431,7 +7401,7 @@
         <p:spPr>
           <a:xfrm>
             <a:off x="1026941" y="1690688"/>
-            <a:ext cx="10522633" cy="1477328"/>
+            <a:ext cx="10522633" cy="2062103"/>
           </a:xfrm>
           <a:prstGeom prst="rect">
             <a:avLst/>
@@ -7449,8 +7419,10 @@
               <a:buChar char="•"/>
             </a:pPr>
             <a:r>
-              <a:rPr lang="fr-FR" dirty="0"/>
-              <a:t>Section entrée des données pour la réservation</a:t>
+              <a:rPr lang="fr-FR" sz="3200" dirty="0">
+                <a:latin typeface="+mj-lt"/>
+              </a:rPr>
+              <a:t>Section présentation izyGO</a:t>
             </a:r>
           </a:p>
           <a:p>
@@ -7459,8 +7431,10 @@
               <a:buChar char="•"/>
             </a:pPr>
             <a:r>
-              <a:rPr lang="fr-FR" dirty="0"/>
-              <a:t>Section avantage du service de réservation son propre bus </a:t>
+              <a:rPr lang="fr-FR" sz="3200" dirty="0">
+                <a:latin typeface="+mj-lt"/>
+              </a:rPr>
+              <a:t>Section chiffres clés</a:t>
             </a:r>
           </a:p>
           <a:p>
@@ -7469,8 +7443,10 @@
               <a:buChar char="•"/>
             </a:pPr>
             <a:r>
-              <a:rPr lang="fr-FR" dirty="0"/>
-              <a:t>Section témoignage des anciens clients</a:t>
+              <a:rPr lang="fr-FR" sz="3200" dirty="0">
+                <a:latin typeface="+mj-lt"/>
+              </a:rPr>
+              <a:t>Section fondateurs</a:t>
             </a:r>
           </a:p>
           <a:p>
@@ -7479,17 +7455,9 @@
               <a:buChar char="•"/>
             </a:pPr>
             <a:r>
-              <a:rPr lang="fr-FR" dirty="0"/>
-              <a:t>Section comment ça marche </a:t>
-            </a:r>
-          </a:p>
-          <a:p>
-            <a:pPr marL="285750" indent="-285750">
-              <a:buFont typeface="Arial" panose="020B0604020202020204" pitchFamily="34" charset="0"/>
-              <a:buChar char="•"/>
-            </a:pPr>
-            <a:r>
-              <a:rPr lang="fr-FR" dirty="0"/>
+              <a:rPr lang="fr-FR" sz="3200" dirty="0">
+                <a:latin typeface="+mj-lt"/>
+              </a:rPr>
               <a:t>Le pied de page</a:t>
             </a:r>
           </a:p>

</xml_diff>